<commit_message>
finished chapter 1 to chapter 3 and added cover and index
</commit_message>
<xml_diff>
--- a/report/fig_environment_of_needed_torque_calculated.pptx
+++ b/report/fig_environment_of_needed_torque_calculated.pptx
@@ -6,6 +6,8 @@
   </p:sldMasterIdLst>
   <p:sldIdLst>
     <p:sldId id="256" r:id="rId2"/>
+    <p:sldId id="257" r:id="rId3"/>
+    <p:sldId id="258" r:id="rId4"/>
   </p:sldIdLst>
   <p:sldSz cx="12192000" cy="6858000"/>
   <p:notesSz cx="6858000" cy="9144000"/>
@@ -104,6 +106,11 @@
       </a:defRPr>
     </a:lvl9pPr>
   </p:defaultTextStyle>
+  <p:extLst>
+    <p:ext uri="{EFAFB233-063F-42B5-8137-9DF3F51BA10A}">
+      <p15:sldGuideLst xmlns:p15="http://schemas.microsoft.com/office/powerpoint/2012/main"/>
+    </p:ext>
+  </p:extLst>
 </p:presentation>
 </file>
 
@@ -238,7 +245,7 @@
           <a:p>
             <a:fld id="{90DEFCBC-670C-410F-9261-1E7D45604883}" type="datetimeFigureOut">
               <a:rPr lang="en-US" smtClean="0"/>
-              <a:t>1/27/2019</a:t>
+              <a:t>1/28/2019</a:t>
             </a:fld>
             <a:endParaRPr lang="en-US"/>
           </a:p>
@@ -440,7 +447,7 @@
           <a:p>
             <a:fld id="{90DEFCBC-670C-410F-9261-1E7D45604883}" type="datetimeFigureOut">
               <a:rPr lang="en-US" smtClean="0"/>
-              <a:t>1/27/2019</a:t>
+              <a:t>1/28/2019</a:t>
             </a:fld>
             <a:endParaRPr lang="en-US"/>
           </a:p>
@@ -652,7 +659,7 @@
           <a:p>
             <a:fld id="{90DEFCBC-670C-410F-9261-1E7D45604883}" type="datetimeFigureOut">
               <a:rPr lang="en-US" smtClean="0"/>
-              <a:t>1/27/2019</a:t>
+              <a:t>1/28/2019</a:t>
             </a:fld>
             <a:endParaRPr lang="en-US"/>
           </a:p>
@@ -854,7 +861,7 @@
           <a:p>
             <a:fld id="{90DEFCBC-670C-410F-9261-1E7D45604883}" type="datetimeFigureOut">
               <a:rPr lang="en-US" smtClean="0"/>
-              <a:t>1/27/2019</a:t>
+              <a:t>1/28/2019</a:t>
             </a:fld>
             <a:endParaRPr lang="en-US"/>
           </a:p>
@@ -1100,7 +1107,7 @@
           <a:p>
             <a:fld id="{90DEFCBC-670C-410F-9261-1E7D45604883}" type="datetimeFigureOut">
               <a:rPr lang="en-US" smtClean="0"/>
-              <a:t>1/27/2019</a:t>
+              <a:t>1/28/2019</a:t>
             </a:fld>
             <a:endParaRPr lang="en-US"/>
           </a:p>
@@ -1396,7 +1403,7 @@
           <a:p>
             <a:fld id="{90DEFCBC-670C-410F-9261-1E7D45604883}" type="datetimeFigureOut">
               <a:rPr lang="en-US" smtClean="0"/>
-              <a:t>1/27/2019</a:t>
+              <a:t>1/28/2019</a:t>
             </a:fld>
             <a:endParaRPr lang="en-US"/>
           </a:p>
@@ -1827,7 +1834,7 @@
           <a:p>
             <a:fld id="{90DEFCBC-670C-410F-9261-1E7D45604883}" type="datetimeFigureOut">
               <a:rPr lang="en-US" smtClean="0"/>
-              <a:t>1/27/2019</a:t>
+              <a:t>1/28/2019</a:t>
             </a:fld>
             <a:endParaRPr lang="en-US"/>
           </a:p>
@@ -1945,7 +1952,7 @@
           <a:p>
             <a:fld id="{90DEFCBC-670C-410F-9261-1E7D45604883}" type="datetimeFigureOut">
               <a:rPr lang="en-US" smtClean="0"/>
-              <a:t>1/27/2019</a:t>
+              <a:t>1/28/2019</a:t>
             </a:fld>
             <a:endParaRPr lang="en-US"/>
           </a:p>
@@ -2040,7 +2047,7 @@
           <a:p>
             <a:fld id="{90DEFCBC-670C-410F-9261-1E7D45604883}" type="datetimeFigureOut">
               <a:rPr lang="en-US" smtClean="0"/>
-              <a:t>1/27/2019</a:t>
+              <a:t>1/28/2019</a:t>
             </a:fld>
             <a:endParaRPr lang="en-US"/>
           </a:p>
@@ -2349,7 +2356,7 @@
           <a:p>
             <a:fld id="{90DEFCBC-670C-410F-9261-1E7D45604883}" type="datetimeFigureOut">
               <a:rPr lang="en-US" smtClean="0"/>
-              <a:t>1/27/2019</a:t>
+              <a:t>1/28/2019</a:t>
             </a:fld>
             <a:endParaRPr lang="en-US"/>
           </a:p>
@@ -2602,7 +2609,7 @@
           <a:p>
             <a:fld id="{90DEFCBC-670C-410F-9261-1E7D45604883}" type="datetimeFigureOut">
               <a:rPr lang="en-US" smtClean="0"/>
-              <a:t>1/27/2019</a:t>
+              <a:t>1/28/2019</a:t>
             </a:fld>
             <a:endParaRPr lang="en-US"/>
           </a:p>
@@ -2847,7 +2854,7 @@
           <a:p>
             <a:fld id="{90DEFCBC-670C-410F-9261-1E7D45604883}" type="datetimeFigureOut">
               <a:rPr lang="en-US" smtClean="0"/>
-              <a:t>1/27/2019</a:t>
+              <a:t>1/28/2019</a:t>
             </a:fld>
             <a:endParaRPr lang="en-US"/>
           </a:p>
@@ -3252,34 +3259,1204 @@
           <a:chExt cx="0" cy="0"/>
         </a:xfrm>
       </p:grpSpPr>
+      <p:sp>
+        <p:nvSpPr>
+          <p:cNvPr id="4" name="正方形/長方形 3"/>
+          <p:cNvSpPr/>
+          <p:nvPr/>
+        </p:nvSpPr>
+        <p:spPr>
+          <a:xfrm>
+            <a:off x="6463553" y="4383741"/>
+            <a:ext cx="2528047" cy="1595718"/>
+          </a:xfrm>
+          <a:prstGeom prst="rect">
+            <a:avLst/>
+          </a:prstGeom>
+        </p:spPr>
+        <p:style>
+          <a:lnRef idx="2">
+            <a:schemeClr val="accent1">
+              <a:shade val="50000"/>
+            </a:schemeClr>
+          </a:lnRef>
+          <a:fillRef idx="1">
+            <a:schemeClr val="accent1"/>
+          </a:fillRef>
+          <a:effectRef idx="0">
+            <a:schemeClr val="accent1"/>
+          </a:effectRef>
+          <a:fontRef idx="minor">
+            <a:schemeClr val="lt1"/>
+          </a:fontRef>
+        </p:style>
+        <p:txBody>
+          <a:bodyPr rtlCol="0" anchor="ctr"/>
+          <a:lstStyle/>
+          <a:p>
+            <a:pPr algn="ctr"/>
+            <a:endParaRPr lang="en-US"/>
+          </a:p>
+        </p:txBody>
+      </p:sp>
+      <p:sp>
+        <p:nvSpPr>
+          <p:cNvPr id="5" name="正方形/長方形 4"/>
+          <p:cNvSpPr/>
+          <p:nvPr/>
+        </p:nvSpPr>
+        <p:spPr>
+          <a:xfrm>
+            <a:off x="3657600" y="358588"/>
+            <a:ext cx="331694" cy="5620871"/>
+          </a:xfrm>
+          <a:prstGeom prst="rect">
+            <a:avLst/>
+          </a:prstGeom>
+        </p:spPr>
+        <p:style>
+          <a:lnRef idx="2">
+            <a:schemeClr val="accent1">
+              <a:shade val="50000"/>
+            </a:schemeClr>
+          </a:lnRef>
+          <a:fillRef idx="1">
+            <a:schemeClr val="accent1"/>
+          </a:fillRef>
+          <a:effectRef idx="0">
+            <a:schemeClr val="accent1"/>
+          </a:effectRef>
+          <a:fontRef idx="minor">
+            <a:schemeClr val="lt1"/>
+          </a:fontRef>
+        </p:style>
+        <p:txBody>
+          <a:bodyPr rtlCol="0" anchor="ctr"/>
+          <a:lstStyle/>
+          <a:p>
+            <a:pPr algn="ctr"/>
+            <a:endParaRPr lang="en-US"/>
+          </a:p>
+        </p:txBody>
+      </p:sp>
+      <p:sp>
+        <p:nvSpPr>
+          <p:cNvPr id="6" name="正方形/長方形 5"/>
+          <p:cNvSpPr/>
+          <p:nvPr/>
+        </p:nvSpPr>
+        <p:spPr>
+          <a:xfrm>
+            <a:off x="6759388" y="3774141"/>
+            <a:ext cx="295836" cy="591671"/>
+          </a:xfrm>
+          <a:prstGeom prst="rect">
+            <a:avLst/>
+          </a:prstGeom>
+        </p:spPr>
+        <p:style>
+          <a:lnRef idx="2">
+            <a:schemeClr val="accent1">
+              <a:shade val="50000"/>
+            </a:schemeClr>
+          </a:lnRef>
+          <a:fillRef idx="1">
+            <a:schemeClr val="accent1"/>
+          </a:fillRef>
+          <a:effectRef idx="0">
+            <a:schemeClr val="accent1"/>
+          </a:effectRef>
+          <a:fontRef idx="minor">
+            <a:schemeClr val="lt1"/>
+          </a:fontRef>
+        </p:style>
+        <p:txBody>
+          <a:bodyPr rtlCol="0" anchor="ctr"/>
+          <a:lstStyle/>
+          <a:p>
+            <a:pPr algn="ctr"/>
+            <a:endParaRPr lang="en-US"/>
+          </a:p>
+        </p:txBody>
+      </p:sp>
+      <p:sp>
+        <p:nvSpPr>
+          <p:cNvPr id="7" name="楕円 6"/>
+          <p:cNvSpPr/>
+          <p:nvPr/>
+        </p:nvSpPr>
+        <p:spPr>
+          <a:xfrm>
+            <a:off x="6566647" y="3092823"/>
+            <a:ext cx="681318" cy="681318"/>
+          </a:xfrm>
+          <a:prstGeom prst="ellipse">
+            <a:avLst/>
+          </a:prstGeom>
+        </p:spPr>
+        <p:style>
+          <a:lnRef idx="2">
+            <a:schemeClr val="accent1">
+              <a:shade val="50000"/>
+            </a:schemeClr>
+          </a:lnRef>
+          <a:fillRef idx="1">
+            <a:schemeClr val="accent1"/>
+          </a:fillRef>
+          <a:effectRef idx="0">
+            <a:schemeClr val="accent1"/>
+          </a:effectRef>
+          <a:fontRef idx="minor">
+            <a:schemeClr val="lt1"/>
+          </a:fontRef>
+        </p:style>
+        <p:txBody>
+          <a:bodyPr rtlCol="0" anchor="ctr"/>
+          <a:lstStyle/>
+          <a:p>
+            <a:pPr algn="ctr"/>
+            <a:endParaRPr lang="en-US"/>
+          </a:p>
+        </p:txBody>
+      </p:sp>
+      <p:sp>
+        <p:nvSpPr>
+          <p:cNvPr id="8" name="正方形/長方形 7"/>
+          <p:cNvSpPr/>
+          <p:nvPr/>
+        </p:nvSpPr>
+        <p:spPr>
+          <a:xfrm rot="17500758">
+            <a:off x="5876177" y="2438400"/>
+            <a:ext cx="286870" cy="1290917"/>
+          </a:xfrm>
+          <a:prstGeom prst="rect">
+            <a:avLst/>
+          </a:prstGeom>
+        </p:spPr>
+        <p:style>
+          <a:lnRef idx="2">
+            <a:schemeClr val="accent1">
+              <a:shade val="50000"/>
+            </a:schemeClr>
+          </a:lnRef>
+          <a:fillRef idx="1">
+            <a:schemeClr val="accent1"/>
+          </a:fillRef>
+          <a:effectRef idx="0">
+            <a:schemeClr val="accent1"/>
+          </a:effectRef>
+          <a:fontRef idx="minor">
+            <a:schemeClr val="lt1"/>
+          </a:fontRef>
+        </p:style>
+        <p:txBody>
+          <a:bodyPr rtlCol="0" anchor="ctr"/>
+          <a:lstStyle/>
+          <a:p>
+            <a:pPr algn="ctr"/>
+            <a:endParaRPr lang="en-US"/>
+          </a:p>
+        </p:txBody>
+      </p:sp>
+      <p:sp>
+        <p:nvSpPr>
+          <p:cNvPr id="9" name="楕円 8"/>
+          <p:cNvSpPr/>
+          <p:nvPr/>
+        </p:nvSpPr>
+        <p:spPr>
+          <a:xfrm>
+            <a:off x="4791259" y="2402540"/>
+            <a:ext cx="681318" cy="681318"/>
+          </a:xfrm>
+          <a:prstGeom prst="ellipse">
+            <a:avLst/>
+          </a:prstGeom>
+        </p:spPr>
+        <p:style>
+          <a:lnRef idx="2">
+            <a:schemeClr val="accent1">
+              <a:shade val="50000"/>
+            </a:schemeClr>
+          </a:lnRef>
+          <a:fillRef idx="1">
+            <a:schemeClr val="accent1"/>
+          </a:fillRef>
+          <a:effectRef idx="0">
+            <a:schemeClr val="accent1"/>
+          </a:effectRef>
+          <a:fontRef idx="minor">
+            <a:schemeClr val="lt1"/>
+          </a:fontRef>
+        </p:style>
+        <p:txBody>
+          <a:bodyPr rtlCol="0" anchor="ctr"/>
+          <a:lstStyle/>
+          <a:p>
+            <a:pPr algn="ctr"/>
+            <a:endParaRPr lang="en-US"/>
+          </a:p>
+        </p:txBody>
+      </p:sp>
+      <p:sp>
+        <p:nvSpPr>
+          <p:cNvPr id="10" name="正方形/長方形 9"/>
+          <p:cNvSpPr/>
+          <p:nvPr/>
+        </p:nvSpPr>
+        <p:spPr>
+          <a:xfrm rot="2824350">
+            <a:off x="4289747" y="2745317"/>
+            <a:ext cx="286870" cy="1290917"/>
+          </a:xfrm>
+          <a:prstGeom prst="rect">
+            <a:avLst/>
+          </a:prstGeom>
+        </p:spPr>
+        <p:style>
+          <a:lnRef idx="2">
+            <a:schemeClr val="accent1">
+              <a:shade val="50000"/>
+            </a:schemeClr>
+          </a:lnRef>
+          <a:fillRef idx="1">
+            <a:schemeClr val="accent1"/>
+          </a:fillRef>
+          <a:effectRef idx="0">
+            <a:schemeClr val="accent1"/>
+          </a:effectRef>
+          <a:fontRef idx="minor">
+            <a:schemeClr val="lt1"/>
+          </a:fontRef>
+        </p:style>
+        <p:txBody>
+          <a:bodyPr rtlCol="0" anchor="ctr"/>
+          <a:lstStyle/>
+          <a:p>
+            <a:pPr algn="ctr"/>
+            <a:endParaRPr lang="en-US"/>
+          </a:p>
+        </p:txBody>
+      </p:sp>
+      <p:cxnSp>
+        <p:nvCxnSpPr>
+          <p:cNvPr id="12" name="直線コネクタ 11"/>
+          <p:cNvCxnSpPr/>
+          <p:nvPr/>
+        </p:nvCxnSpPr>
+        <p:spPr>
+          <a:xfrm flipH="1">
+            <a:off x="1237129" y="3444564"/>
+            <a:ext cx="6400800" cy="0"/>
+          </a:xfrm>
+          <a:prstGeom prst="line">
+            <a:avLst/>
+          </a:prstGeom>
+        </p:spPr>
+        <p:style>
+          <a:lnRef idx="1">
+            <a:schemeClr val="accent1"/>
+          </a:lnRef>
+          <a:fillRef idx="0">
+            <a:schemeClr val="accent1"/>
+          </a:fillRef>
+          <a:effectRef idx="0">
+            <a:schemeClr val="accent1"/>
+          </a:effectRef>
+          <a:fontRef idx="minor">
+            <a:schemeClr val="tx1"/>
+          </a:fontRef>
+        </p:style>
+      </p:cxnSp>
+      <p:cxnSp>
+        <p:nvCxnSpPr>
+          <p:cNvPr id="15" name="直線コネクタ 14"/>
+          <p:cNvCxnSpPr/>
+          <p:nvPr/>
+        </p:nvCxnSpPr>
+        <p:spPr>
+          <a:xfrm>
+            <a:off x="1371600" y="1846729"/>
+            <a:ext cx="3171825" cy="0"/>
+          </a:xfrm>
+          <a:prstGeom prst="line">
+            <a:avLst/>
+          </a:prstGeom>
+        </p:spPr>
+        <p:style>
+          <a:lnRef idx="1">
+            <a:schemeClr val="accent1"/>
+          </a:lnRef>
+          <a:fillRef idx="0">
+            <a:schemeClr val="accent1"/>
+          </a:fillRef>
+          <a:effectRef idx="0">
+            <a:schemeClr val="accent1"/>
+          </a:effectRef>
+          <a:fontRef idx="minor">
+            <a:schemeClr val="tx1"/>
+          </a:fontRef>
+        </p:style>
+      </p:cxnSp>
+      <p:cxnSp>
+        <p:nvCxnSpPr>
+          <p:cNvPr id="17" name="直線コネクタ 16"/>
+          <p:cNvCxnSpPr/>
+          <p:nvPr/>
+        </p:nvCxnSpPr>
+        <p:spPr>
+          <a:xfrm>
+            <a:off x="1757082" y="1846729"/>
+            <a:ext cx="0" cy="3182471"/>
+          </a:xfrm>
+          <a:prstGeom prst="line">
+            <a:avLst/>
+          </a:prstGeom>
+        </p:spPr>
+        <p:style>
+          <a:lnRef idx="1">
+            <a:schemeClr val="accent1"/>
+          </a:lnRef>
+          <a:fillRef idx="0">
+            <a:schemeClr val="accent1"/>
+          </a:fillRef>
+          <a:effectRef idx="0">
+            <a:schemeClr val="accent1"/>
+          </a:effectRef>
+          <a:fontRef idx="minor">
+            <a:schemeClr val="tx1"/>
+          </a:fontRef>
+        </p:style>
+      </p:cxnSp>
+      <p:sp>
+        <p:nvSpPr>
+          <p:cNvPr id="19" name="テキスト ボックス 18"/>
+          <p:cNvSpPr txBox="1"/>
+          <p:nvPr/>
+        </p:nvSpPr>
+        <p:spPr>
+          <a:xfrm>
+            <a:off x="1084729" y="2572871"/>
+            <a:ext cx="535724" cy="369332"/>
+          </a:xfrm>
+          <a:prstGeom prst="rect">
+            <a:avLst/>
+          </a:prstGeom>
+          <a:noFill/>
+        </p:spPr>
+        <p:txBody>
+          <a:bodyPr wrap="none" rtlCol="0">
+            <a:spAutoFit/>
+          </a:bodyPr>
+          <a:lstStyle/>
+          <a:p>
+            <a:r>
+              <a:rPr lang="en-US" dirty="0" smtClean="0"/>
+              <a:t>150</a:t>
+            </a:r>
+            <a:endParaRPr lang="en-US" dirty="0"/>
+          </a:p>
+        </p:txBody>
+      </p:sp>
+      <p:sp>
+        <p:nvSpPr>
+          <p:cNvPr id="20" name="テキスト ボックス 19"/>
+          <p:cNvSpPr txBox="1"/>
+          <p:nvPr/>
+        </p:nvSpPr>
+        <p:spPr>
+          <a:xfrm>
+            <a:off x="1084729" y="4014409"/>
+            <a:ext cx="535724" cy="369332"/>
+          </a:xfrm>
+          <a:prstGeom prst="rect">
+            <a:avLst/>
+          </a:prstGeom>
+          <a:noFill/>
+        </p:spPr>
+        <p:txBody>
+          <a:bodyPr wrap="none" rtlCol="0">
+            <a:spAutoFit/>
+          </a:bodyPr>
+          <a:lstStyle/>
+          <a:p>
+            <a:r>
+              <a:rPr lang="en-US" dirty="0" smtClean="0"/>
+              <a:t>150</a:t>
+            </a:r>
+            <a:endParaRPr lang="en-US" dirty="0"/>
+          </a:p>
+        </p:txBody>
+      </p:sp>
+      <p:sp>
+        <p:nvSpPr>
+          <p:cNvPr id="21" name="下矢印 20"/>
+          <p:cNvSpPr/>
+          <p:nvPr/>
+        </p:nvSpPr>
+        <p:spPr>
+          <a:xfrm rot="10800000">
+            <a:off x="4086619" y="1846729"/>
+            <a:ext cx="277906" cy="1376032"/>
+          </a:xfrm>
+          <a:prstGeom prst="downArrow">
+            <a:avLst/>
+          </a:prstGeom>
+        </p:spPr>
+        <p:style>
+          <a:lnRef idx="2">
+            <a:schemeClr val="accent1">
+              <a:shade val="50000"/>
+            </a:schemeClr>
+          </a:lnRef>
+          <a:fillRef idx="1">
+            <a:schemeClr val="accent1"/>
+          </a:fillRef>
+          <a:effectRef idx="0">
+            <a:schemeClr val="accent1"/>
+          </a:effectRef>
+          <a:fontRef idx="minor">
+            <a:schemeClr val="lt1"/>
+          </a:fontRef>
+        </p:style>
+        <p:txBody>
+          <a:bodyPr rtlCol="0" anchor="ctr"/>
+          <a:lstStyle/>
+          <a:p>
+            <a:pPr algn="ctr"/>
+            <a:endParaRPr lang="en-US"/>
+          </a:p>
+        </p:txBody>
+      </p:sp>
+      <p:cxnSp>
+        <p:nvCxnSpPr>
+          <p:cNvPr id="23" name="直線コネクタ 22"/>
+          <p:cNvCxnSpPr/>
+          <p:nvPr/>
+        </p:nvCxnSpPr>
+        <p:spPr>
+          <a:xfrm>
+            <a:off x="6907306" y="2828314"/>
+            <a:ext cx="0" cy="3751780"/>
+          </a:xfrm>
+          <a:prstGeom prst="line">
+            <a:avLst/>
+          </a:prstGeom>
+        </p:spPr>
+        <p:style>
+          <a:lnRef idx="1">
+            <a:schemeClr val="accent1"/>
+          </a:lnRef>
+          <a:fillRef idx="0">
+            <a:schemeClr val="accent1"/>
+          </a:fillRef>
+          <a:effectRef idx="0">
+            <a:schemeClr val="accent1"/>
+          </a:effectRef>
+          <a:fontRef idx="minor">
+            <a:schemeClr val="tx1"/>
+          </a:fontRef>
+        </p:style>
+      </p:cxnSp>
+      <p:cxnSp>
+        <p:nvCxnSpPr>
+          <p:cNvPr id="26" name="直線コネクタ 25"/>
+          <p:cNvCxnSpPr>
+            <a:stCxn id="5" idx="2"/>
+          </p:cNvCxnSpPr>
+          <p:nvPr/>
+        </p:nvCxnSpPr>
+        <p:spPr>
+          <a:xfrm>
+            <a:off x="3823447" y="5979459"/>
+            <a:ext cx="0" cy="609600"/>
+          </a:xfrm>
+          <a:prstGeom prst="line">
+            <a:avLst/>
+          </a:prstGeom>
+        </p:spPr>
+        <p:style>
+          <a:lnRef idx="1">
+            <a:schemeClr val="accent1"/>
+          </a:lnRef>
+          <a:fillRef idx="0">
+            <a:schemeClr val="accent1"/>
+          </a:fillRef>
+          <a:effectRef idx="0">
+            <a:schemeClr val="accent1"/>
+          </a:effectRef>
+          <a:fontRef idx="minor">
+            <a:schemeClr val="tx1"/>
+          </a:fontRef>
+        </p:style>
+      </p:cxnSp>
+      <p:cxnSp>
+        <p:nvCxnSpPr>
+          <p:cNvPr id="28" name="直線コネクタ 27"/>
+          <p:cNvCxnSpPr/>
+          <p:nvPr/>
+        </p:nvCxnSpPr>
+        <p:spPr>
+          <a:xfrm flipV="1">
+            <a:off x="3823447" y="6293224"/>
+            <a:ext cx="3083859" cy="0"/>
+          </a:xfrm>
+          <a:prstGeom prst="line">
+            <a:avLst/>
+          </a:prstGeom>
+        </p:spPr>
+        <p:style>
+          <a:lnRef idx="1">
+            <a:schemeClr val="accent1"/>
+          </a:lnRef>
+          <a:fillRef idx="0">
+            <a:schemeClr val="accent1"/>
+          </a:fillRef>
+          <a:effectRef idx="0">
+            <a:schemeClr val="accent1"/>
+          </a:effectRef>
+          <a:fontRef idx="minor">
+            <a:schemeClr val="tx1"/>
+          </a:fontRef>
+        </p:style>
+      </p:cxnSp>
+      <p:sp>
+        <p:nvSpPr>
+          <p:cNvPr id="29" name="テキスト ボックス 28"/>
+          <p:cNvSpPr txBox="1"/>
+          <p:nvPr/>
+        </p:nvSpPr>
+        <p:spPr>
+          <a:xfrm>
+            <a:off x="5109884" y="5952563"/>
+            <a:ext cx="535724" cy="369332"/>
+          </a:xfrm>
+          <a:prstGeom prst="rect">
+            <a:avLst/>
+          </a:prstGeom>
+          <a:noFill/>
+        </p:spPr>
+        <p:txBody>
+          <a:bodyPr wrap="none" rtlCol="0">
+            <a:spAutoFit/>
+          </a:bodyPr>
+          <a:lstStyle/>
+          <a:p>
+            <a:r>
+              <a:rPr lang="en-US" dirty="0" smtClean="0"/>
+              <a:t>150</a:t>
+            </a:r>
+            <a:endParaRPr lang="en-US" dirty="0"/>
+          </a:p>
+        </p:txBody>
+      </p:sp>
+      <p:sp>
+        <p:nvSpPr>
+          <p:cNvPr id="30" name="右矢印 29"/>
+          <p:cNvSpPr/>
+          <p:nvPr/>
+        </p:nvSpPr>
+        <p:spPr>
+          <a:xfrm rot="10800000">
+            <a:off x="2936073" y="3666215"/>
+            <a:ext cx="1039395" cy="329915"/>
+          </a:xfrm>
+          <a:prstGeom prst="rightArrow">
+            <a:avLst/>
+          </a:prstGeom>
+        </p:spPr>
+        <p:style>
+          <a:lnRef idx="2">
+            <a:schemeClr val="accent1">
+              <a:shade val="50000"/>
+            </a:schemeClr>
+          </a:lnRef>
+          <a:fillRef idx="1">
+            <a:schemeClr val="accent1"/>
+          </a:fillRef>
+          <a:effectRef idx="0">
+            <a:schemeClr val="accent1"/>
+          </a:effectRef>
+          <a:fontRef idx="minor">
+            <a:schemeClr val="lt1"/>
+          </a:fontRef>
+        </p:style>
+        <p:txBody>
+          <a:bodyPr rtlCol="0" anchor="ctr"/>
+          <a:lstStyle/>
+          <a:p>
+            <a:pPr algn="ctr"/>
+            <a:endParaRPr lang="en-US"/>
+          </a:p>
+        </p:txBody>
+      </p:sp>
+      <p:sp>
+        <p:nvSpPr>
+          <p:cNvPr id="31" name="テキスト ボックス 30"/>
+          <p:cNvSpPr txBox="1"/>
+          <p:nvPr/>
+        </p:nvSpPr>
+        <p:spPr>
+          <a:xfrm>
+            <a:off x="2972364" y="3406704"/>
+            <a:ext cx="567784" cy="369332"/>
+          </a:xfrm>
+          <a:prstGeom prst="rect">
+            <a:avLst/>
+          </a:prstGeom>
+          <a:noFill/>
+        </p:spPr>
+        <p:txBody>
+          <a:bodyPr wrap="none" rtlCol="0">
+            <a:spAutoFit/>
+          </a:bodyPr>
+          <a:lstStyle/>
+          <a:p>
+            <a:r>
+              <a:rPr lang="en-US" dirty="0" smtClean="0"/>
+              <a:t>10N</a:t>
+            </a:r>
+            <a:endParaRPr lang="en-US" dirty="0"/>
+          </a:p>
+        </p:txBody>
+      </p:sp>
+      <p:cxnSp>
+        <p:nvCxnSpPr>
+          <p:cNvPr id="54" name="直線コネクタ 53"/>
+          <p:cNvCxnSpPr/>
+          <p:nvPr/>
+        </p:nvCxnSpPr>
+        <p:spPr>
+          <a:xfrm>
+            <a:off x="1371600" y="5029200"/>
+            <a:ext cx="3171825" cy="0"/>
+          </a:xfrm>
+          <a:prstGeom prst="line">
+            <a:avLst/>
+          </a:prstGeom>
+        </p:spPr>
+        <p:style>
+          <a:lnRef idx="1">
+            <a:schemeClr val="accent1"/>
+          </a:lnRef>
+          <a:fillRef idx="0">
+            <a:schemeClr val="accent1"/>
+          </a:fillRef>
+          <a:effectRef idx="0">
+            <a:schemeClr val="accent1"/>
+          </a:effectRef>
+          <a:fontRef idx="minor">
+            <a:schemeClr val="tx1"/>
+          </a:fontRef>
+        </p:style>
+      </p:cxnSp>
+    </p:spTree>
+    <p:extLst>
+      <p:ext uri="{BB962C8B-B14F-4D97-AF65-F5344CB8AC3E}">
+        <p14:creationId xmlns:p14="http://schemas.microsoft.com/office/powerpoint/2010/main" val="3120440130"/>
+      </p:ext>
+    </p:extLst>
+  </p:cSld>
+  <p:clrMapOvr>
+    <a:masterClrMapping/>
+  </p:clrMapOvr>
+</p:sld>
+</file>
+
+<file path=ppt/slides/slide2.xml><?xml version="1.0" encoding="utf-8"?>
+<p:sld xmlns:a="http://schemas.openxmlformats.org/drawingml/2006/main" xmlns:r="http://schemas.openxmlformats.org/officeDocument/2006/relationships" xmlns:p="http://schemas.openxmlformats.org/presentationml/2006/main">
+  <p:cSld>
+    <p:spTree>
+      <p:nvGrpSpPr>
+        <p:cNvPr id="1" name=""/>
+        <p:cNvGrpSpPr/>
+        <p:nvPr/>
+      </p:nvGrpSpPr>
+      <p:grpSpPr>
+        <a:xfrm>
+          <a:off x="0" y="0"/>
+          <a:ext cx="0" cy="0"/>
+          <a:chOff x="0" y="0"/>
+          <a:chExt cx="0" cy="0"/>
+        </a:xfrm>
+      </p:grpSpPr>
       <p:grpSp>
         <p:nvGrpSpPr>
-          <p:cNvPr id="56" name="グループ化 55"/>
+          <p:cNvPr id="47" name="グループ化 46"/>
           <p:cNvGrpSpPr/>
           <p:nvPr/>
         </p:nvGrpSpPr>
         <p:grpSpPr>
           <a:xfrm>
-            <a:off x="1084729" y="358588"/>
-            <a:ext cx="7906871" cy="6230471"/>
-            <a:chOff x="1084729" y="358588"/>
-            <a:chExt cx="7906871" cy="6230471"/>
+            <a:off x="2402541" y="1165854"/>
+            <a:ext cx="4458171" cy="3457671"/>
+            <a:chOff x="2402541" y="1165854"/>
+            <a:chExt cx="4458171" cy="3457671"/>
           </a:xfrm>
         </p:grpSpPr>
         <p:sp>
           <p:nvSpPr>
-            <p:cNvPr id="4" name="正方形/長方形 3"/>
+            <p:cNvPr id="2" name="テキスト ボックス 1"/>
+            <p:cNvSpPr txBox="1"/>
+            <p:nvPr/>
+          </p:nvSpPr>
+          <p:spPr>
+            <a:xfrm>
+              <a:off x="2402541" y="1667434"/>
+              <a:ext cx="415498" cy="276999"/>
+            </a:xfrm>
+            <a:prstGeom prst="rect">
+              <a:avLst/>
+            </a:prstGeom>
+            <a:noFill/>
+          </p:spPr>
+          <p:txBody>
+            <a:bodyPr wrap="none" rtlCol="0">
+              <a:spAutoFit/>
+            </a:bodyPr>
+            <a:lstStyle/>
+            <a:p>
+              <a:r>
+                <a:rPr lang="en-US" sz="1200" dirty="0" smtClean="0">
+                  <a:latin typeface="Times New Roman" panose="02020603050405020304" pitchFamily="18" charset="0"/>
+                  <a:cs typeface="Times New Roman" panose="02020603050405020304" pitchFamily="18" charset="0"/>
+                </a:rPr>
+                <a:t>150</a:t>
+              </a:r>
+              <a:endParaRPr lang="en-US" sz="1200" dirty="0">
+                <a:latin typeface="Times New Roman" panose="02020603050405020304" pitchFamily="18" charset="0"/>
+                <a:cs typeface="Times New Roman" panose="02020603050405020304" pitchFamily="18" charset="0"/>
+              </a:endParaRPr>
+            </a:p>
+          </p:txBody>
+        </p:sp>
+        <p:cxnSp>
+          <p:nvCxnSpPr>
+            <p:cNvPr id="5" name="直線コネクタ 4"/>
+            <p:cNvCxnSpPr/>
+            <p:nvPr/>
+          </p:nvCxnSpPr>
+          <p:spPr>
+            <a:xfrm>
+              <a:off x="2818039" y="1165854"/>
+              <a:ext cx="0" cy="2560320"/>
+            </a:xfrm>
+            <a:prstGeom prst="line">
+              <a:avLst/>
+            </a:prstGeom>
+            <a:ln>
+              <a:solidFill>
+                <a:schemeClr val="tx1"/>
+              </a:solidFill>
+            </a:ln>
+          </p:spPr>
+          <p:style>
+            <a:lnRef idx="1">
+              <a:schemeClr val="accent1"/>
+            </a:lnRef>
+            <a:fillRef idx="0">
+              <a:schemeClr val="accent1"/>
+            </a:fillRef>
+            <a:effectRef idx="0">
+              <a:schemeClr val="accent1"/>
+            </a:effectRef>
+            <a:fontRef idx="minor">
+              <a:schemeClr val="tx1"/>
+            </a:fontRef>
+          </p:style>
+        </p:cxnSp>
+        <p:sp>
+          <p:nvSpPr>
+            <p:cNvPr id="7" name="テキスト ボックス 6"/>
+            <p:cNvSpPr txBox="1"/>
+            <p:nvPr/>
+          </p:nvSpPr>
+          <p:spPr>
+            <a:xfrm>
+              <a:off x="2402541" y="2949387"/>
+              <a:ext cx="415498" cy="276999"/>
+            </a:xfrm>
+            <a:prstGeom prst="rect">
+              <a:avLst/>
+            </a:prstGeom>
+            <a:noFill/>
+          </p:spPr>
+          <p:txBody>
+            <a:bodyPr wrap="none" rtlCol="0">
+              <a:spAutoFit/>
+            </a:bodyPr>
+            <a:lstStyle/>
+            <a:p>
+              <a:r>
+                <a:rPr lang="en-US" sz="1200" dirty="0" smtClean="0">
+                  <a:latin typeface="Times New Roman" panose="02020603050405020304" pitchFamily="18" charset="0"/>
+                  <a:cs typeface="Times New Roman" panose="02020603050405020304" pitchFamily="18" charset="0"/>
+                </a:rPr>
+                <a:t>150</a:t>
+              </a:r>
+              <a:endParaRPr lang="en-US" sz="1200" dirty="0">
+                <a:latin typeface="Times New Roman" panose="02020603050405020304" pitchFamily="18" charset="0"/>
+                <a:cs typeface="Times New Roman" panose="02020603050405020304" pitchFamily="18" charset="0"/>
+              </a:endParaRPr>
+            </a:p>
+          </p:txBody>
+        </p:sp>
+        <p:cxnSp>
+          <p:nvCxnSpPr>
+            <p:cNvPr id="9" name="直線コネクタ 8"/>
+            <p:cNvCxnSpPr/>
+            <p:nvPr/>
+          </p:nvCxnSpPr>
+          <p:spPr>
+            <a:xfrm>
+              <a:off x="2689412" y="2454979"/>
+              <a:ext cx="2991298" cy="0"/>
+            </a:xfrm>
+            <a:prstGeom prst="line">
+              <a:avLst/>
+            </a:prstGeom>
+            <a:ln>
+              <a:solidFill>
+                <a:schemeClr val="tx1"/>
+              </a:solidFill>
+            </a:ln>
+          </p:spPr>
+          <p:style>
+            <a:lnRef idx="1">
+              <a:schemeClr val="accent1"/>
+            </a:lnRef>
+            <a:fillRef idx="0">
+              <a:schemeClr val="accent1"/>
+            </a:fillRef>
+            <a:effectRef idx="0">
+              <a:schemeClr val="accent1"/>
+            </a:effectRef>
+            <a:fontRef idx="minor">
+              <a:schemeClr val="tx1"/>
+            </a:fontRef>
+          </p:style>
+        </p:cxnSp>
+        <p:cxnSp>
+          <p:nvCxnSpPr>
+            <p:cNvPr id="10" name="直線コネクタ 9"/>
+            <p:cNvCxnSpPr/>
+            <p:nvPr/>
+          </p:nvCxnSpPr>
+          <p:spPr>
+            <a:xfrm>
+              <a:off x="2689412" y="1165854"/>
+              <a:ext cx="1678700" cy="0"/>
+            </a:xfrm>
+            <a:prstGeom prst="line">
+              <a:avLst/>
+            </a:prstGeom>
+            <a:ln>
+              <a:solidFill>
+                <a:schemeClr val="tx1"/>
+              </a:solidFill>
+            </a:ln>
+          </p:spPr>
+          <p:style>
+            <a:lnRef idx="1">
+              <a:schemeClr val="accent1"/>
+            </a:lnRef>
+            <a:fillRef idx="0">
+              <a:schemeClr val="accent1"/>
+            </a:fillRef>
+            <a:effectRef idx="0">
+              <a:schemeClr val="accent1"/>
+            </a:effectRef>
+            <a:fontRef idx="minor">
+              <a:schemeClr val="tx1"/>
+            </a:fontRef>
+          </p:style>
+        </p:cxnSp>
+        <p:cxnSp>
+          <p:nvCxnSpPr>
+            <p:cNvPr id="11" name="直線コネクタ 10"/>
+            <p:cNvCxnSpPr/>
+            <p:nvPr/>
+          </p:nvCxnSpPr>
+          <p:spPr>
+            <a:xfrm>
+              <a:off x="2689412" y="3726174"/>
+              <a:ext cx="1678700" cy="0"/>
+            </a:xfrm>
+            <a:prstGeom prst="line">
+              <a:avLst/>
+            </a:prstGeom>
+            <a:ln>
+              <a:solidFill>
+                <a:schemeClr val="tx1"/>
+              </a:solidFill>
+            </a:ln>
+          </p:spPr>
+          <p:style>
+            <a:lnRef idx="1">
+              <a:schemeClr val="accent1"/>
+            </a:lnRef>
+            <a:fillRef idx="0">
+              <a:schemeClr val="accent1"/>
+            </a:fillRef>
+            <a:effectRef idx="0">
+              <a:schemeClr val="accent1"/>
+            </a:effectRef>
+            <a:fontRef idx="minor">
+              <a:schemeClr val="tx1"/>
+            </a:fontRef>
+          </p:style>
+        </p:cxnSp>
+        <p:sp>
+          <p:nvSpPr>
+            <p:cNvPr id="12" name="角丸四角形 11"/>
             <p:cNvSpPr/>
             <p:nvPr/>
           </p:nvSpPr>
           <p:spPr>
             <a:xfrm>
-              <a:off x="6463553" y="4383741"/>
-              <a:ext cx="2528047" cy="1595718"/>
+              <a:off x="3379694" y="1165854"/>
+              <a:ext cx="851647" cy="2560320"/>
             </a:xfrm>
-            <a:prstGeom prst="rect">
+            <a:prstGeom prst="roundRect">
               <a:avLst/>
             </a:prstGeom>
+            <a:pattFill prst="pct40">
+              <a:fgClr>
+                <a:schemeClr val="bg1">
+                  <a:lumMod val="50000"/>
+                </a:schemeClr>
+              </a:fgClr>
+              <a:bgClr>
+                <a:schemeClr val="bg1"/>
+              </a:bgClr>
+            </a:pattFill>
+            <a:ln>
+              <a:solidFill>
+                <a:schemeClr val="tx1"/>
+              </a:solidFill>
+            </a:ln>
+          </p:spPr>
+          <p:style>
+            <a:lnRef idx="2">
+              <a:schemeClr val="accent1">
+                <a:shade val="50000"/>
+              </a:schemeClr>
+            </a:lnRef>
+            <a:fillRef idx="1">
+              <a:schemeClr val="accent1"/>
+            </a:fillRef>
+            <a:effectRef idx="0">
+              <a:schemeClr val="accent1"/>
+            </a:effectRef>
+            <a:fontRef idx="minor">
+              <a:schemeClr val="lt1"/>
+            </a:fontRef>
+          </p:style>
+          <p:txBody>
+            <a:bodyPr rtlCol="0" anchor="ctr"/>
+            <a:lstStyle/>
+            <a:p>
+              <a:pPr algn="ctr"/>
+              <a:endParaRPr lang="en-US"/>
+            </a:p>
+          </p:txBody>
+        </p:sp>
+        <p:cxnSp>
+          <p:nvCxnSpPr>
+            <p:cNvPr id="14" name="直線コネクタ 13"/>
+            <p:cNvCxnSpPr/>
+            <p:nvPr/>
+          </p:nvCxnSpPr>
+          <p:spPr>
+            <a:xfrm>
+              <a:off x="5506330" y="2274570"/>
+              <a:ext cx="0" cy="2183130"/>
+            </a:xfrm>
+            <a:prstGeom prst="line">
+              <a:avLst/>
+            </a:prstGeom>
+            <a:ln>
+              <a:solidFill>
+                <a:schemeClr val="tx1"/>
+              </a:solidFill>
+            </a:ln>
+          </p:spPr>
+          <p:style>
+            <a:lnRef idx="1">
+              <a:schemeClr val="accent1"/>
+            </a:lnRef>
+            <a:fillRef idx="0">
+              <a:schemeClr val="accent1"/>
+            </a:fillRef>
+            <a:effectRef idx="0">
+              <a:schemeClr val="accent1"/>
+            </a:effectRef>
+            <a:fontRef idx="minor">
+              <a:schemeClr val="tx1"/>
+            </a:fontRef>
+          </p:style>
+        </p:cxnSp>
+        <p:cxnSp>
+          <p:nvCxnSpPr>
+            <p:cNvPr id="16" name="直線コネクタ 15"/>
+            <p:cNvCxnSpPr/>
+            <p:nvPr/>
+          </p:nvCxnSpPr>
+          <p:spPr>
+            <a:xfrm>
+              <a:off x="4231341" y="4346526"/>
+              <a:ext cx="1280160" cy="0"/>
+            </a:xfrm>
+            <a:prstGeom prst="line">
+              <a:avLst/>
+            </a:prstGeom>
+            <a:ln>
+              <a:solidFill>
+                <a:schemeClr val="tx1"/>
+              </a:solidFill>
+            </a:ln>
+          </p:spPr>
+          <p:style>
+            <a:lnRef idx="1">
+              <a:schemeClr val="accent1"/>
+            </a:lnRef>
+            <a:fillRef idx="0">
+              <a:schemeClr val="accent1"/>
+            </a:fillRef>
+            <a:effectRef idx="0">
+              <a:schemeClr val="accent1"/>
+            </a:effectRef>
+            <a:fontRef idx="minor">
+              <a:schemeClr val="tx1"/>
+            </a:fontRef>
+          </p:style>
+        </p:cxnSp>
+        <p:cxnSp>
+          <p:nvCxnSpPr>
+            <p:cNvPr id="19" name="直線コネクタ 18"/>
+            <p:cNvCxnSpPr/>
+            <p:nvPr/>
+          </p:nvCxnSpPr>
+          <p:spPr>
+            <a:xfrm>
+              <a:off x="4231341" y="2274570"/>
+              <a:ext cx="0" cy="2183130"/>
+            </a:xfrm>
+            <a:prstGeom prst="line">
+              <a:avLst/>
+            </a:prstGeom>
+            <a:ln>
+              <a:solidFill>
+                <a:schemeClr val="tx1"/>
+              </a:solidFill>
+            </a:ln>
+          </p:spPr>
+          <p:style>
+            <a:lnRef idx="1">
+              <a:schemeClr val="accent1"/>
+            </a:lnRef>
+            <a:fillRef idx="0">
+              <a:schemeClr val="accent1"/>
+            </a:fillRef>
+            <a:effectRef idx="0">
+              <a:schemeClr val="accent1"/>
+            </a:effectRef>
+            <a:fontRef idx="minor">
+              <a:schemeClr val="tx1"/>
+            </a:fontRef>
+          </p:style>
+        </p:cxnSp>
+        <p:cxnSp>
+          <p:nvCxnSpPr>
+            <p:cNvPr id="24" name="直線コネクタ 23"/>
+            <p:cNvCxnSpPr/>
+            <p:nvPr/>
+          </p:nvCxnSpPr>
+          <p:spPr>
+            <a:xfrm rot="2376410" flipV="1">
+              <a:off x="4364896" y="2046918"/>
+              <a:ext cx="1280160" cy="0"/>
+            </a:xfrm>
+            <a:prstGeom prst="line">
+              <a:avLst/>
+            </a:prstGeom>
+            <a:ln>
+              <a:solidFill>
+                <a:schemeClr val="tx1"/>
+              </a:solidFill>
+            </a:ln>
+          </p:spPr>
+          <p:style>
+            <a:lnRef idx="1">
+              <a:schemeClr val="accent1"/>
+            </a:lnRef>
+            <a:fillRef idx="0">
+              <a:schemeClr val="accent1"/>
+            </a:fillRef>
+            <a:effectRef idx="0">
+              <a:schemeClr val="accent1"/>
+            </a:effectRef>
+            <a:fontRef idx="minor">
+              <a:schemeClr val="tx1"/>
+            </a:fontRef>
+          </p:style>
+        </p:cxnSp>
+        <p:cxnSp>
+          <p:nvCxnSpPr>
+            <p:cNvPr id="29" name="直線コネクタ 28"/>
+            <p:cNvCxnSpPr/>
+            <p:nvPr/>
+          </p:nvCxnSpPr>
+          <p:spPr>
+            <a:xfrm rot="16918498" flipV="1">
+              <a:off x="3740497" y="2264650"/>
+              <a:ext cx="1280160" cy="0"/>
+            </a:xfrm>
+            <a:prstGeom prst="line">
+              <a:avLst/>
+            </a:prstGeom>
+            <a:ln>
+              <a:solidFill>
+                <a:schemeClr val="tx1"/>
+              </a:solidFill>
+            </a:ln>
+          </p:spPr>
+          <p:style>
+            <a:lnRef idx="1">
+              <a:schemeClr val="accent1"/>
+            </a:lnRef>
+            <a:fillRef idx="0">
+              <a:schemeClr val="accent1"/>
+            </a:fillRef>
+            <a:effectRef idx="0">
+              <a:schemeClr val="accent1"/>
+            </a:effectRef>
+            <a:fontRef idx="minor">
+              <a:schemeClr val="tx1"/>
+            </a:fontRef>
+          </p:style>
+        </p:cxnSp>
+        <p:sp>
+          <p:nvSpPr>
+            <p:cNvPr id="33" name="楕円 32"/>
+            <p:cNvSpPr/>
+            <p:nvPr/>
+          </p:nvSpPr>
+          <p:spPr>
+            <a:xfrm>
+              <a:off x="4368112" y="1499999"/>
+              <a:ext cx="287443" cy="276999"/>
+            </a:xfrm>
+            <a:prstGeom prst="ellipse">
+              <a:avLst/>
+            </a:prstGeom>
+            <a:noFill/>
+            <a:ln w="98425" cmpd="thinThick">
+              <a:solidFill>
+                <a:schemeClr val="tx1"/>
+              </a:solidFill>
+            </a:ln>
           </p:spPr>
           <p:style>
             <a:lnRef idx="2">
@@ -3308,18 +4485,24 @@
         </p:sp>
         <p:sp>
           <p:nvSpPr>
-            <p:cNvPr id="5" name="正方形/長方形 4"/>
+            <p:cNvPr id="34" name="楕円 33"/>
             <p:cNvSpPr/>
             <p:nvPr/>
           </p:nvSpPr>
           <p:spPr>
             <a:xfrm>
-              <a:off x="3657600" y="358588"/>
-              <a:ext cx="331694" cy="5620871"/>
+              <a:off x="5358503" y="2307514"/>
+              <a:ext cx="287443" cy="276999"/>
             </a:xfrm>
-            <a:prstGeom prst="rect">
+            <a:prstGeom prst="ellipse">
               <a:avLst/>
             </a:prstGeom>
+            <a:noFill/>
+            <a:ln w="98425" cmpd="thinThick">
+              <a:solidFill>
+                <a:schemeClr val="tx1"/>
+              </a:solidFill>
+            </a:ln>
           </p:spPr>
           <p:style>
             <a:lnRef idx="2">
@@ -3348,18 +4531,69 @@
         </p:sp>
         <p:sp>
           <p:nvSpPr>
-            <p:cNvPr id="6" name="正方形/長方形 5"/>
+            <p:cNvPr id="36" name="テキスト ボックス 35"/>
+            <p:cNvSpPr txBox="1"/>
+            <p:nvPr/>
+          </p:nvSpPr>
+          <p:spPr>
+            <a:xfrm>
+              <a:off x="4667491" y="4346526"/>
+              <a:ext cx="415498" cy="276999"/>
+            </a:xfrm>
+            <a:prstGeom prst="rect">
+              <a:avLst/>
+            </a:prstGeom>
+            <a:noFill/>
+          </p:spPr>
+          <p:txBody>
+            <a:bodyPr wrap="none" rtlCol="0">
+              <a:spAutoFit/>
+            </a:bodyPr>
+            <a:lstStyle/>
+            <a:p>
+              <a:r>
+                <a:rPr lang="en-US" sz="1200" dirty="0" smtClean="0">
+                  <a:latin typeface="Times New Roman" panose="02020603050405020304" pitchFamily="18" charset="0"/>
+                  <a:cs typeface="Times New Roman" panose="02020603050405020304" pitchFamily="18" charset="0"/>
+                </a:rPr>
+                <a:t>150</a:t>
+              </a:r>
+              <a:endParaRPr lang="en-US" sz="1200" dirty="0">
+                <a:latin typeface="Times New Roman" panose="02020603050405020304" pitchFamily="18" charset="0"/>
+                <a:cs typeface="Times New Roman" panose="02020603050405020304" pitchFamily="18" charset="0"/>
+              </a:endParaRPr>
+            </a:p>
+          </p:txBody>
+        </p:sp>
+        <p:sp>
+          <p:nvSpPr>
+            <p:cNvPr id="37" name="右矢印 36"/>
             <p:cNvSpPr/>
             <p:nvPr/>
           </p:nvSpPr>
           <p:spPr>
-            <a:xfrm>
-              <a:off x="6759388" y="3774141"/>
-              <a:ext cx="295836" cy="591671"/>
+            <a:xfrm rot="10800000">
+              <a:off x="3833042" y="2709991"/>
+              <a:ext cx="400921" cy="361619"/>
             </a:xfrm>
-            <a:prstGeom prst="rect">
+            <a:prstGeom prst="rightArrow">
               <a:avLst/>
             </a:prstGeom>
+            <a:pattFill prst="pct90">
+              <a:fgClr>
+                <a:schemeClr val="bg1">
+                  <a:lumMod val="50000"/>
+                </a:schemeClr>
+              </a:fgClr>
+              <a:bgClr>
+                <a:schemeClr val="bg1"/>
+              </a:bgClr>
+            </a:pattFill>
+            <a:ln>
+              <a:solidFill>
+                <a:schemeClr val="tx1"/>
+              </a:solidFill>
+            </a:ln>
           </p:spPr>
           <p:style>
             <a:lnRef idx="2">
@@ -3388,178 +4622,64 @@
         </p:sp>
         <p:sp>
           <p:nvSpPr>
-            <p:cNvPr id="7" name="楕円 6"/>
-            <p:cNvSpPr/>
+            <p:cNvPr id="38" name="テキスト ボックス 37"/>
+            <p:cNvSpPr txBox="1"/>
             <p:nvPr/>
           </p:nvSpPr>
           <p:spPr>
             <a:xfrm>
-              <a:off x="6566647" y="3092823"/>
-              <a:ext cx="681318" cy="681318"/>
+              <a:off x="3766123" y="2432991"/>
+              <a:ext cx="449162" cy="276999"/>
             </a:xfrm>
-            <a:prstGeom prst="ellipse">
+            <a:prstGeom prst="rect">
               <a:avLst/>
             </a:prstGeom>
+            <a:noFill/>
           </p:spPr>
-          <p:style>
-            <a:lnRef idx="2">
-              <a:schemeClr val="accent1">
-                <a:shade val="50000"/>
-              </a:schemeClr>
-            </a:lnRef>
-            <a:fillRef idx="1">
-              <a:schemeClr val="accent1"/>
-            </a:fillRef>
-            <a:effectRef idx="0">
-              <a:schemeClr val="accent1"/>
-            </a:effectRef>
-            <a:fontRef idx="minor">
-              <a:schemeClr val="lt1"/>
-            </a:fontRef>
-          </p:style>
           <p:txBody>
-            <a:bodyPr rtlCol="0" anchor="ctr"/>
+            <a:bodyPr wrap="none" rtlCol="0">
+              <a:spAutoFit/>
+            </a:bodyPr>
             <a:lstStyle/>
             <a:p>
-              <a:pPr algn="ctr"/>
-              <a:endParaRPr lang="en-US"/>
+              <a:r>
+                <a:rPr lang="en-US" sz="1200" dirty="0" smtClean="0">
+                  <a:latin typeface="Times New Roman" panose="02020603050405020304" pitchFamily="18" charset="0"/>
+                  <a:cs typeface="Times New Roman" panose="02020603050405020304" pitchFamily="18" charset="0"/>
+                </a:rPr>
+                <a:t>10N</a:t>
+              </a:r>
+              <a:endParaRPr lang="en-US" sz="1200" dirty="0">
+                <a:latin typeface="Times New Roman" panose="02020603050405020304" pitchFamily="18" charset="0"/>
+                <a:cs typeface="Times New Roman" panose="02020603050405020304" pitchFamily="18" charset="0"/>
+              </a:endParaRPr>
             </a:p>
           </p:txBody>
         </p:sp>
         <p:sp>
           <p:nvSpPr>
-            <p:cNvPr id="8" name="正方形/長方形 7"/>
+            <p:cNvPr id="40" name="円弧 39"/>
             <p:cNvSpPr/>
             <p:nvPr/>
           </p:nvSpPr>
           <p:spPr>
-            <a:xfrm rot="17500758">
-              <a:off x="5876177" y="2438400"/>
-              <a:ext cx="286870" cy="1290917"/>
+            <a:xfrm rot="17795651">
+              <a:off x="5186049" y="2110996"/>
+              <a:ext cx="640080" cy="640080"/>
             </a:xfrm>
-            <a:prstGeom prst="rect">
-              <a:avLst/>
+            <a:prstGeom prst="arc">
+              <a:avLst>
+                <a:gd name="adj1" fmla="val 16707533"/>
+                <a:gd name="adj2" fmla="val 20204395"/>
+              </a:avLst>
             </a:prstGeom>
-          </p:spPr>
-          <p:style>
-            <a:lnRef idx="2">
-              <a:schemeClr val="accent1">
-                <a:shade val="50000"/>
-              </a:schemeClr>
-            </a:lnRef>
-            <a:fillRef idx="1">
-              <a:schemeClr val="accent1"/>
-            </a:fillRef>
-            <a:effectRef idx="0">
-              <a:schemeClr val="accent1"/>
-            </a:effectRef>
-            <a:fontRef idx="minor">
-              <a:schemeClr val="lt1"/>
-            </a:fontRef>
-          </p:style>
-          <p:txBody>
-            <a:bodyPr rtlCol="0" anchor="ctr"/>
-            <a:lstStyle/>
-            <a:p>
-              <a:pPr algn="ctr"/>
-              <a:endParaRPr lang="en-US"/>
-            </a:p>
-          </p:txBody>
-        </p:sp>
-        <p:sp>
-          <p:nvSpPr>
-            <p:cNvPr id="9" name="楕円 8"/>
-            <p:cNvSpPr/>
-            <p:nvPr/>
-          </p:nvSpPr>
-          <p:spPr>
-            <a:xfrm>
-              <a:off x="4791259" y="2402540"/>
-              <a:ext cx="681318" cy="681318"/>
-            </a:xfrm>
-            <a:prstGeom prst="ellipse">
-              <a:avLst/>
-            </a:prstGeom>
-          </p:spPr>
-          <p:style>
-            <a:lnRef idx="2">
-              <a:schemeClr val="accent1">
-                <a:shade val="50000"/>
-              </a:schemeClr>
-            </a:lnRef>
-            <a:fillRef idx="1">
-              <a:schemeClr val="accent1"/>
-            </a:fillRef>
-            <a:effectRef idx="0">
-              <a:schemeClr val="accent1"/>
-            </a:effectRef>
-            <a:fontRef idx="minor">
-              <a:schemeClr val="lt1"/>
-            </a:fontRef>
-          </p:style>
-          <p:txBody>
-            <a:bodyPr rtlCol="0" anchor="ctr"/>
-            <a:lstStyle/>
-            <a:p>
-              <a:pPr algn="ctr"/>
-              <a:endParaRPr lang="en-US"/>
-            </a:p>
-          </p:txBody>
-        </p:sp>
-        <p:sp>
-          <p:nvSpPr>
-            <p:cNvPr id="10" name="正方形/長方形 9"/>
-            <p:cNvSpPr/>
-            <p:nvPr/>
-          </p:nvSpPr>
-          <p:spPr>
-            <a:xfrm rot="2824350">
-              <a:off x="4289747" y="2745317"/>
-              <a:ext cx="286870" cy="1290917"/>
-            </a:xfrm>
-            <a:prstGeom prst="rect">
-              <a:avLst/>
-            </a:prstGeom>
-          </p:spPr>
-          <p:style>
-            <a:lnRef idx="2">
-              <a:schemeClr val="accent1">
-                <a:shade val="50000"/>
-              </a:schemeClr>
-            </a:lnRef>
-            <a:fillRef idx="1">
-              <a:schemeClr val="accent1"/>
-            </a:fillRef>
-            <a:effectRef idx="0">
-              <a:schemeClr val="accent1"/>
-            </a:effectRef>
-            <a:fontRef idx="minor">
-              <a:schemeClr val="lt1"/>
-            </a:fontRef>
-          </p:style>
-          <p:txBody>
-            <a:bodyPr rtlCol="0" anchor="ctr"/>
-            <a:lstStyle/>
-            <a:p>
-              <a:pPr algn="ctr"/>
-              <a:endParaRPr lang="en-US"/>
-            </a:p>
-          </p:txBody>
-        </p:sp>
-        <p:cxnSp>
-          <p:nvCxnSpPr>
-            <p:cNvPr id="12" name="直線コネクタ 11"/>
-            <p:cNvCxnSpPr/>
-            <p:nvPr/>
-          </p:nvCxnSpPr>
-          <p:spPr>
-            <a:xfrm flipH="1">
-              <a:off x="1237129" y="3444564"/>
-              <a:ext cx="6400800" cy="0"/>
-            </a:xfrm>
-            <a:prstGeom prst="line">
-              <a:avLst/>
-            </a:prstGeom>
+            <a:ln>
+              <a:solidFill>
+                <a:schemeClr val="tx1"/>
+              </a:solidFill>
+              <a:headEnd type="none" w="med" len="med"/>
+              <a:tailEnd type="triangle" w="med" len="med"/>
+            </a:ln>
           </p:spPr>
           <p:style>
             <a:lnRef idx="1">
@@ -3575,77 +4695,25 @@
               <a:schemeClr val="tx1"/>
             </a:fontRef>
           </p:style>
-        </p:cxnSp>
-        <p:cxnSp>
-          <p:nvCxnSpPr>
-            <p:cNvPr id="15" name="直線コネクタ 14"/>
-            <p:cNvCxnSpPr/>
-            <p:nvPr/>
-          </p:nvCxnSpPr>
-          <p:spPr>
-            <a:xfrm>
-              <a:off x="1371600" y="1846729"/>
-              <a:ext cx="3171825" cy="0"/>
-            </a:xfrm>
-            <a:prstGeom prst="line">
-              <a:avLst/>
-            </a:prstGeom>
-          </p:spPr>
-          <p:style>
-            <a:lnRef idx="1">
-              <a:schemeClr val="accent1"/>
-            </a:lnRef>
-            <a:fillRef idx="0">
-              <a:schemeClr val="accent1"/>
-            </a:fillRef>
-            <a:effectRef idx="0">
-              <a:schemeClr val="accent1"/>
-            </a:effectRef>
-            <a:fontRef idx="minor">
-              <a:schemeClr val="tx1"/>
-            </a:fontRef>
-          </p:style>
-        </p:cxnSp>
-        <p:cxnSp>
-          <p:nvCxnSpPr>
-            <p:cNvPr id="17" name="直線コネクタ 16"/>
-            <p:cNvCxnSpPr/>
-            <p:nvPr/>
-          </p:nvCxnSpPr>
-          <p:spPr>
-            <a:xfrm>
-              <a:off x="1757082" y="1846729"/>
-              <a:ext cx="0" cy="3182471"/>
-            </a:xfrm>
-            <a:prstGeom prst="line">
-              <a:avLst/>
-            </a:prstGeom>
-          </p:spPr>
-          <p:style>
-            <a:lnRef idx="1">
-              <a:schemeClr val="accent1"/>
-            </a:lnRef>
-            <a:fillRef idx="0">
-              <a:schemeClr val="accent1"/>
-            </a:fillRef>
-            <a:effectRef idx="0">
-              <a:schemeClr val="accent1"/>
-            </a:effectRef>
-            <a:fontRef idx="minor">
-              <a:schemeClr val="tx1"/>
-            </a:fontRef>
-          </p:style>
-        </p:cxnSp>
+          <p:txBody>
+            <a:bodyPr rtlCol="0" anchor="ctr"/>
+            <a:lstStyle/>
+            <a:p>
+              <a:pPr algn="ctr"/>
+              <a:endParaRPr lang="en-US"/>
+            </a:p>
+          </p:txBody>
+        </p:sp>
         <p:sp>
           <p:nvSpPr>
-            <p:cNvPr id="19" name="テキスト ボックス 18"/>
+            <p:cNvPr id="41" name="テキスト ボックス 40"/>
             <p:cNvSpPr txBox="1"/>
             <p:nvPr/>
           </p:nvSpPr>
           <p:spPr>
             <a:xfrm>
-              <a:off x="1084729" y="2572871"/>
-              <a:ext cx="535724" cy="369332"/>
+              <a:off x="5797600" y="2307513"/>
+              <a:ext cx="1063112" cy="276999"/>
             </a:xfrm>
             <a:prstGeom prst="rect">
               <a:avLst/>
@@ -3659,23 +4727,29 @@
             <a:lstStyle/>
             <a:p>
               <a:r>
-                <a:rPr lang="en-US" dirty="0" smtClean="0"/>
-                <a:t>100</a:t>
+                <a:rPr lang="en-US" sz="1200" dirty="0" smtClean="0">
+                  <a:latin typeface="Times New Roman" panose="02020603050405020304" pitchFamily="18" charset="0"/>
+                  <a:cs typeface="Times New Roman" panose="02020603050405020304" pitchFamily="18" charset="0"/>
+                </a:rPr>
+                <a:t>Shoulder joint</a:t>
               </a:r>
-              <a:endParaRPr lang="en-US" dirty="0"/>
+              <a:endParaRPr lang="en-US" sz="1200" dirty="0">
+                <a:latin typeface="Times New Roman" panose="02020603050405020304" pitchFamily="18" charset="0"/>
+                <a:cs typeface="Times New Roman" panose="02020603050405020304" pitchFamily="18" charset="0"/>
+              </a:endParaRPr>
             </a:p>
           </p:txBody>
         </p:sp>
         <p:sp>
           <p:nvSpPr>
-            <p:cNvPr id="20" name="テキスト ボックス 19"/>
+            <p:cNvPr id="42" name="テキスト ボックス 41"/>
             <p:cNvSpPr txBox="1"/>
             <p:nvPr/>
           </p:nvSpPr>
           <p:spPr>
             <a:xfrm>
-              <a:off x="1084729" y="4014409"/>
-              <a:ext cx="535724" cy="369332"/>
+              <a:off x="4449280" y="1177846"/>
+              <a:ext cx="909223" cy="276999"/>
             </a:xfrm>
             <a:prstGeom prst="rect">
               <a:avLst/>
@@ -3689,155 +4763,29 @@
             <a:lstStyle/>
             <a:p>
               <a:r>
-                <a:rPr lang="en-US" dirty="0" smtClean="0"/>
-                <a:t>100</a:t>
+                <a:rPr lang="en-US" sz="1200" dirty="0" smtClean="0">
+                  <a:latin typeface="Times New Roman" panose="02020603050405020304" pitchFamily="18" charset="0"/>
+                  <a:cs typeface="Times New Roman" panose="02020603050405020304" pitchFamily="18" charset="0"/>
+                </a:rPr>
+                <a:t>Elbow joint</a:t>
               </a:r>
-              <a:endParaRPr lang="en-US" dirty="0"/>
+              <a:endParaRPr lang="en-US" sz="1200" dirty="0">
+                <a:latin typeface="Times New Roman" panose="02020603050405020304" pitchFamily="18" charset="0"/>
+                <a:cs typeface="Times New Roman" panose="02020603050405020304" pitchFamily="18" charset="0"/>
+              </a:endParaRPr>
             </a:p>
           </p:txBody>
         </p:sp>
         <p:sp>
           <p:nvSpPr>
-            <p:cNvPr id="21" name="下矢印 20"/>
-            <p:cNvSpPr/>
-            <p:nvPr/>
-          </p:nvSpPr>
-          <p:spPr>
-            <a:xfrm rot="10800000">
-              <a:off x="4086619" y="1846729"/>
-              <a:ext cx="277906" cy="1376032"/>
-            </a:xfrm>
-            <a:prstGeom prst="downArrow">
-              <a:avLst/>
-            </a:prstGeom>
-          </p:spPr>
-          <p:style>
-            <a:lnRef idx="2">
-              <a:schemeClr val="accent1">
-                <a:shade val="50000"/>
-              </a:schemeClr>
-            </a:lnRef>
-            <a:fillRef idx="1">
-              <a:schemeClr val="accent1"/>
-            </a:fillRef>
-            <a:effectRef idx="0">
-              <a:schemeClr val="accent1"/>
-            </a:effectRef>
-            <a:fontRef idx="minor">
-              <a:schemeClr val="lt1"/>
-            </a:fontRef>
-          </p:style>
-          <p:txBody>
-            <a:bodyPr rtlCol="0" anchor="ctr"/>
-            <a:lstStyle/>
-            <a:p>
-              <a:pPr algn="ctr"/>
-              <a:endParaRPr lang="en-US"/>
-            </a:p>
-          </p:txBody>
-        </p:sp>
-        <p:cxnSp>
-          <p:nvCxnSpPr>
-            <p:cNvPr id="23" name="直線コネクタ 22"/>
-            <p:cNvCxnSpPr/>
-            <p:nvPr/>
-          </p:nvCxnSpPr>
-          <p:spPr>
-            <a:xfrm>
-              <a:off x="6907306" y="2828314"/>
-              <a:ext cx="0" cy="3751780"/>
-            </a:xfrm>
-            <a:prstGeom prst="line">
-              <a:avLst/>
-            </a:prstGeom>
-          </p:spPr>
-          <p:style>
-            <a:lnRef idx="1">
-              <a:schemeClr val="accent1"/>
-            </a:lnRef>
-            <a:fillRef idx="0">
-              <a:schemeClr val="accent1"/>
-            </a:fillRef>
-            <a:effectRef idx="0">
-              <a:schemeClr val="accent1"/>
-            </a:effectRef>
-            <a:fontRef idx="minor">
-              <a:schemeClr val="tx1"/>
-            </a:fontRef>
-          </p:style>
-        </p:cxnSp>
-        <p:cxnSp>
-          <p:nvCxnSpPr>
-            <p:cNvPr id="26" name="直線コネクタ 25"/>
-            <p:cNvCxnSpPr>
-              <a:stCxn id="5" idx="2"/>
-            </p:cNvCxnSpPr>
-            <p:nvPr/>
-          </p:nvCxnSpPr>
-          <p:spPr>
-            <a:xfrm>
-              <a:off x="3823447" y="5979459"/>
-              <a:ext cx="0" cy="609600"/>
-            </a:xfrm>
-            <a:prstGeom prst="line">
-              <a:avLst/>
-            </a:prstGeom>
-          </p:spPr>
-          <p:style>
-            <a:lnRef idx="1">
-              <a:schemeClr val="accent1"/>
-            </a:lnRef>
-            <a:fillRef idx="0">
-              <a:schemeClr val="accent1"/>
-            </a:fillRef>
-            <a:effectRef idx="0">
-              <a:schemeClr val="accent1"/>
-            </a:effectRef>
-            <a:fontRef idx="minor">
-              <a:schemeClr val="tx1"/>
-            </a:fontRef>
-          </p:style>
-        </p:cxnSp>
-        <p:cxnSp>
-          <p:nvCxnSpPr>
-            <p:cNvPr id="28" name="直線コネクタ 27"/>
-            <p:cNvCxnSpPr/>
-            <p:nvPr/>
-          </p:nvCxnSpPr>
-          <p:spPr>
-            <a:xfrm flipV="1">
-              <a:off x="3823447" y="6293224"/>
-              <a:ext cx="3083859" cy="0"/>
-            </a:xfrm>
-            <a:prstGeom prst="line">
-              <a:avLst/>
-            </a:prstGeom>
-          </p:spPr>
-          <p:style>
-            <a:lnRef idx="1">
-              <a:schemeClr val="accent1"/>
-            </a:lnRef>
-            <a:fillRef idx="0">
-              <a:schemeClr val="accent1"/>
-            </a:fillRef>
-            <a:effectRef idx="0">
-              <a:schemeClr val="accent1"/>
-            </a:effectRef>
-            <a:fontRef idx="minor">
-              <a:schemeClr val="tx1"/>
-            </a:fontRef>
-          </p:style>
-        </p:cxnSp>
-        <p:sp>
-          <p:nvSpPr>
-            <p:cNvPr id="29" name="テキスト ボックス 28"/>
+            <p:cNvPr id="46" name="テキスト ボックス 45"/>
             <p:cNvSpPr txBox="1"/>
             <p:nvPr/>
           </p:nvSpPr>
           <p:spPr>
             <a:xfrm>
-              <a:off x="5109884" y="5952563"/>
-              <a:ext cx="535724" cy="369332"/>
+              <a:off x="5999579" y="4346526"/>
+              <a:ext cx="861133" cy="276999"/>
             </a:xfrm>
             <a:prstGeom prst="rect">
               <a:avLst/>
@@ -3851,63 +4799,1709 @@
             <a:lstStyle/>
             <a:p>
               <a:r>
-                <a:rPr lang="en-US" dirty="0" smtClean="0"/>
-                <a:t>200</a:t>
+                <a:rPr lang="en-US" sz="1200" dirty="0" smtClean="0">
+                  <a:latin typeface="Times New Roman" panose="02020603050405020304" pitchFamily="18" charset="0"/>
+                  <a:cs typeface="Times New Roman" panose="02020603050405020304" pitchFamily="18" charset="0"/>
+                </a:rPr>
+                <a:t>Units[mm]</a:t>
               </a:r>
-              <a:endParaRPr lang="en-US" dirty="0"/>
+              <a:endParaRPr lang="en-US" sz="1200" dirty="0">
+                <a:latin typeface="Times New Roman" panose="02020603050405020304" pitchFamily="18" charset="0"/>
+                <a:cs typeface="Times New Roman" panose="02020603050405020304" pitchFamily="18" charset="0"/>
+              </a:endParaRPr>
             </a:p>
           </p:txBody>
         </p:sp>
+      </p:grpSp>
+    </p:spTree>
+    <p:extLst>
+      <p:ext uri="{BB962C8B-B14F-4D97-AF65-F5344CB8AC3E}">
+        <p14:creationId xmlns:p14="http://schemas.microsoft.com/office/powerpoint/2010/main" val="65564618"/>
+      </p:ext>
+    </p:extLst>
+  </p:cSld>
+  <p:clrMapOvr>
+    <a:masterClrMapping/>
+  </p:clrMapOvr>
+</p:sld>
+</file>
+
+<file path=ppt/slides/slide3.xml><?xml version="1.0" encoding="utf-8"?>
+<p:sld xmlns:a="http://schemas.openxmlformats.org/drawingml/2006/main" xmlns:r="http://schemas.openxmlformats.org/officeDocument/2006/relationships" xmlns:p="http://schemas.openxmlformats.org/presentationml/2006/main">
+  <p:cSld>
+    <p:spTree>
+      <p:nvGrpSpPr>
+        <p:cNvPr id="1" name=""/>
+        <p:cNvGrpSpPr/>
+        <p:nvPr/>
+      </p:nvGrpSpPr>
+      <p:grpSpPr>
+        <a:xfrm>
+          <a:off x="0" y="0"/>
+          <a:ext cx="0" cy="0"/>
+          <a:chOff x="0" y="0"/>
+          <a:chExt cx="0" cy="0"/>
+        </a:xfrm>
+      </p:grpSpPr>
+      <p:grpSp>
+        <p:nvGrpSpPr>
+          <p:cNvPr id="56" name="グループ化 55"/>
+          <p:cNvGrpSpPr/>
+          <p:nvPr/>
+        </p:nvGrpSpPr>
+        <p:grpSpPr>
+          <a:xfrm>
+            <a:off x="2402541" y="999839"/>
+            <a:ext cx="4148310" cy="5580133"/>
+            <a:chOff x="2402541" y="999839"/>
+            <a:chExt cx="4148310" cy="5580133"/>
+          </a:xfrm>
+        </p:grpSpPr>
+        <p:grpSp>
+          <p:nvGrpSpPr>
+            <p:cNvPr id="53" name="グループ化 52"/>
+            <p:cNvGrpSpPr/>
+            <p:nvPr/>
+          </p:nvGrpSpPr>
+          <p:grpSpPr>
+            <a:xfrm>
+              <a:off x="2402541" y="999839"/>
+              <a:ext cx="4148310" cy="5580133"/>
+              <a:chOff x="2402541" y="999839"/>
+              <a:chExt cx="4148310" cy="5580133"/>
+            </a:xfrm>
+          </p:grpSpPr>
+          <p:grpSp>
+            <p:nvGrpSpPr>
+              <p:cNvPr id="51" name="グループ化 50"/>
+              <p:cNvGrpSpPr/>
+              <p:nvPr/>
+            </p:nvGrpSpPr>
+            <p:grpSpPr>
+              <a:xfrm>
+                <a:off x="2402541" y="3122301"/>
+                <a:ext cx="4148310" cy="3457671"/>
+                <a:chOff x="2402541" y="3122301"/>
+                <a:chExt cx="4148310" cy="3457671"/>
+              </a:xfrm>
+            </p:grpSpPr>
+            <p:sp>
+              <p:nvSpPr>
+                <p:cNvPr id="3" name="テキスト ボックス 2"/>
+                <p:cNvSpPr txBox="1"/>
+                <p:nvPr/>
+              </p:nvSpPr>
+              <p:spPr>
+                <a:xfrm>
+                  <a:off x="2402541" y="3623881"/>
+                  <a:ext cx="415498" cy="276999"/>
+                </a:xfrm>
+                <a:prstGeom prst="rect">
+                  <a:avLst/>
+                </a:prstGeom>
+                <a:noFill/>
+              </p:spPr>
+              <p:txBody>
+                <a:bodyPr wrap="none" rtlCol="0">
+                  <a:spAutoFit/>
+                </a:bodyPr>
+                <a:lstStyle/>
+                <a:p>
+                  <a:r>
+                    <a:rPr lang="en-US" sz="1200" dirty="0" smtClean="0">
+                      <a:latin typeface="Times New Roman" panose="02020603050405020304" pitchFamily="18" charset="0"/>
+                      <a:cs typeface="Times New Roman" panose="02020603050405020304" pitchFamily="18" charset="0"/>
+                    </a:rPr>
+                    <a:t>150</a:t>
+                  </a:r>
+                  <a:endParaRPr lang="en-US" sz="1200" dirty="0">
+                    <a:latin typeface="Times New Roman" panose="02020603050405020304" pitchFamily="18" charset="0"/>
+                    <a:cs typeface="Times New Roman" panose="02020603050405020304" pitchFamily="18" charset="0"/>
+                  </a:endParaRPr>
+                </a:p>
+              </p:txBody>
+            </p:sp>
+            <p:cxnSp>
+              <p:nvCxnSpPr>
+                <p:cNvPr id="4" name="直線コネクタ 3"/>
+                <p:cNvCxnSpPr/>
+                <p:nvPr/>
+              </p:nvCxnSpPr>
+              <p:spPr>
+                <a:xfrm>
+                  <a:off x="2818039" y="3122301"/>
+                  <a:ext cx="0" cy="2560320"/>
+                </a:xfrm>
+                <a:prstGeom prst="line">
+                  <a:avLst/>
+                </a:prstGeom>
+                <a:ln>
+                  <a:solidFill>
+                    <a:schemeClr val="tx1"/>
+                  </a:solidFill>
+                </a:ln>
+              </p:spPr>
+              <p:style>
+                <a:lnRef idx="1">
+                  <a:schemeClr val="accent1"/>
+                </a:lnRef>
+                <a:fillRef idx="0">
+                  <a:schemeClr val="accent1"/>
+                </a:fillRef>
+                <a:effectRef idx="0">
+                  <a:schemeClr val="accent1"/>
+                </a:effectRef>
+                <a:fontRef idx="minor">
+                  <a:schemeClr val="tx1"/>
+                </a:fontRef>
+              </p:style>
+            </p:cxnSp>
+            <p:sp>
+              <p:nvSpPr>
+                <p:cNvPr id="5" name="テキスト ボックス 4"/>
+                <p:cNvSpPr txBox="1"/>
+                <p:nvPr/>
+              </p:nvSpPr>
+              <p:spPr>
+                <a:xfrm>
+                  <a:off x="2402541" y="4905834"/>
+                  <a:ext cx="415498" cy="276999"/>
+                </a:xfrm>
+                <a:prstGeom prst="rect">
+                  <a:avLst/>
+                </a:prstGeom>
+                <a:noFill/>
+              </p:spPr>
+              <p:txBody>
+                <a:bodyPr wrap="none" rtlCol="0">
+                  <a:spAutoFit/>
+                </a:bodyPr>
+                <a:lstStyle/>
+                <a:p>
+                  <a:r>
+                    <a:rPr lang="en-US" sz="1200" dirty="0" smtClean="0">
+                      <a:latin typeface="Times New Roman" panose="02020603050405020304" pitchFamily="18" charset="0"/>
+                      <a:cs typeface="Times New Roman" panose="02020603050405020304" pitchFamily="18" charset="0"/>
+                    </a:rPr>
+                    <a:t>150</a:t>
+                  </a:r>
+                  <a:endParaRPr lang="en-US" sz="1200" dirty="0">
+                    <a:latin typeface="Times New Roman" panose="02020603050405020304" pitchFamily="18" charset="0"/>
+                    <a:cs typeface="Times New Roman" panose="02020603050405020304" pitchFamily="18" charset="0"/>
+                  </a:endParaRPr>
+                </a:p>
+              </p:txBody>
+            </p:sp>
+            <p:cxnSp>
+              <p:nvCxnSpPr>
+                <p:cNvPr id="6" name="直線コネクタ 5"/>
+                <p:cNvCxnSpPr/>
+                <p:nvPr/>
+              </p:nvCxnSpPr>
+              <p:spPr>
+                <a:xfrm>
+                  <a:off x="2689412" y="4411426"/>
+                  <a:ext cx="2991298" cy="0"/>
+                </a:xfrm>
+                <a:prstGeom prst="line">
+                  <a:avLst/>
+                </a:prstGeom>
+                <a:ln>
+                  <a:solidFill>
+                    <a:schemeClr val="tx1"/>
+                  </a:solidFill>
+                </a:ln>
+              </p:spPr>
+              <p:style>
+                <a:lnRef idx="1">
+                  <a:schemeClr val="accent1"/>
+                </a:lnRef>
+                <a:fillRef idx="0">
+                  <a:schemeClr val="accent1"/>
+                </a:fillRef>
+                <a:effectRef idx="0">
+                  <a:schemeClr val="accent1"/>
+                </a:effectRef>
+                <a:fontRef idx="minor">
+                  <a:schemeClr val="tx1"/>
+                </a:fontRef>
+              </p:style>
+            </p:cxnSp>
+            <p:cxnSp>
+              <p:nvCxnSpPr>
+                <p:cNvPr id="7" name="直線コネクタ 6"/>
+                <p:cNvCxnSpPr/>
+                <p:nvPr/>
+              </p:nvCxnSpPr>
+              <p:spPr>
+                <a:xfrm>
+                  <a:off x="2689412" y="3122301"/>
+                  <a:ext cx="1678700" cy="0"/>
+                </a:xfrm>
+                <a:prstGeom prst="line">
+                  <a:avLst/>
+                </a:prstGeom>
+                <a:ln>
+                  <a:solidFill>
+                    <a:schemeClr val="tx1"/>
+                  </a:solidFill>
+                </a:ln>
+              </p:spPr>
+              <p:style>
+                <a:lnRef idx="1">
+                  <a:schemeClr val="accent1"/>
+                </a:lnRef>
+                <a:fillRef idx="0">
+                  <a:schemeClr val="accent1"/>
+                </a:fillRef>
+                <a:effectRef idx="0">
+                  <a:schemeClr val="accent1"/>
+                </a:effectRef>
+                <a:fontRef idx="minor">
+                  <a:schemeClr val="tx1"/>
+                </a:fontRef>
+              </p:style>
+            </p:cxnSp>
+            <p:cxnSp>
+              <p:nvCxnSpPr>
+                <p:cNvPr id="8" name="直線コネクタ 7"/>
+                <p:cNvCxnSpPr/>
+                <p:nvPr/>
+              </p:nvCxnSpPr>
+              <p:spPr>
+                <a:xfrm>
+                  <a:off x="2689412" y="5682621"/>
+                  <a:ext cx="1678700" cy="0"/>
+                </a:xfrm>
+                <a:prstGeom prst="line">
+                  <a:avLst/>
+                </a:prstGeom>
+                <a:ln>
+                  <a:solidFill>
+                    <a:schemeClr val="tx1"/>
+                  </a:solidFill>
+                </a:ln>
+              </p:spPr>
+              <p:style>
+                <a:lnRef idx="1">
+                  <a:schemeClr val="accent1"/>
+                </a:lnRef>
+                <a:fillRef idx="0">
+                  <a:schemeClr val="accent1"/>
+                </a:fillRef>
+                <a:effectRef idx="0">
+                  <a:schemeClr val="accent1"/>
+                </a:effectRef>
+                <a:fontRef idx="minor">
+                  <a:schemeClr val="tx1"/>
+                </a:fontRef>
+              </p:style>
+            </p:cxnSp>
+            <p:sp>
+              <p:nvSpPr>
+                <p:cNvPr id="9" name="角丸四角形 8"/>
+                <p:cNvSpPr/>
+                <p:nvPr/>
+              </p:nvSpPr>
+              <p:spPr>
+                <a:xfrm>
+                  <a:off x="3379694" y="3122301"/>
+                  <a:ext cx="851647" cy="2560320"/>
+                </a:xfrm>
+                <a:prstGeom prst="roundRect">
+                  <a:avLst/>
+                </a:prstGeom>
+                <a:pattFill prst="pct40">
+                  <a:fgClr>
+                    <a:schemeClr val="bg1">
+                      <a:lumMod val="50000"/>
+                    </a:schemeClr>
+                  </a:fgClr>
+                  <a:bgClr>
+                    <a:schemeClr val="bg1"/>
+                  </a:bgClr>
+                </a:pattFill>
+                <a:ln>
+                  <a:solidFill>
+                    <a:schemeClr val="tx1"/>
+                  </a:solidFill>
+                </a:ln>
+              </p:spPr>
+              <p:style>
+                <a:lnRef idx="2">
+                  <a:schemeClr val="accent1">
+                    <a:shade val="50000"/>
+                  </a:schemeClr>
+                </a:lnRef>
+                <a:fillRef idx="1">
+                  <a:schemeClr val="accent1"/>
+                </a:fillRef>
+                <a:effectRef idx="0">
+                  <a:schemeClr val="accent1"/>
+                </a:effectRef>
+                <a:fontRef idx="minor">
+                  <a:schemeClr val="lt1"/>
+                </a:fontRef>
+              </p:style>
+              <p:txBody>
+                <a:bodyPr rtlCol="0" anchor="ctr"/>
+                <a:lstStyle/>
+                <a:p>
+                  <a:pPr algn="ctr"/>
+                  <a:endParaRPr lang="en-US"/>
+                </a:p>
+              </p:txBody>
+            </p:sp>
+            <p:cxnSp>
+              <p:nvCxnSpPr>
+                <p:cNvPr id="10" name="直線コネクタ 9"/>
+                <p:cNvCxnSpPr/>
+                <p:nvPr/>
+              </p:nvCxnSpPr>
+              <p:spPr>
+                <a:xfrm>
+                  <a:off x="5506330" y="4231017"/>
+                  <a:ext cx="0" cy="2183130"/>
+                </a:xfrm>
+                <a:prstGeom prst="line">
+                  <a:avLst/>
+                </a:prstGeom>
+                <a:ln>
+                  <a:solidFill>
+                    <a:schemeClr val="tx1"/>
+                  </a:solidFill>
+                </a:ln>
+              </p:spPr>
+              <p:style>
+                <a:lnRef idx="1">
+                  <a:schemeClr val="accent1"/>
+                </a:lnRef>
+                <a:fillRef idx="0">
+                  <a:schemeClr val="accent1"/>
+                </a:fillRef>
+                <a:effectRef idx="0">
+                  <a:schemeClr val="accent1"/>
+                </a:effectRef>
+                <a:fontRef idx="minor">
+                  <a:schemeClr val="tx1"/>
+                </a:fontRef>
+              </p:style>
+            </p:cxnSp>
+            <p:cxnSp>
+              <p:nvCxnSpPr>
+                <p:cNvPr id="11" name="直線コネクタ 10"/>
+                <p:cNvCxnSpPr/>
+                <p:nvPr/>
+              </p:nvCxnSpPr>
+              <p:spPr>
+                <a:xfrm>
+                  <a:off x="4231341" y="6302973"/>
+                  <a:ext cx="1280160" cy="0"/>
+                </a:xfrm>
+                <a:prstGeom prst="line">
+                  <a:avLst/>
+                </a:prstGeom>
+                <a:ln>
+                  <a:solidFill>
+                    <a:schemeClr val="tx1"/>
+                  </a:solidFill>
+                </a:ln>
+              </p:spPr>
+              <p:style>
+                <a:lnRef idx="1">
+                  <a:schemeClr val="accent1"/>
+                </a:lnRef>
+                <a:fillRef idx="0">
+                  <a:schemeClr val="accent1"/>
+                </a:fillRef>
+                <a:effectRef idx="0">
+                  <a:schemeClr val="accent1"/>
+                </a:effectRef>
+                <a:fontRef idx="minor">
+                  <a:schemeClr val="tx1"/>
+                </a:fontRef>
+              </p:style>
+            </p:cxnSp>
+            <p:cxnSp>
+              <p:nvCxnSpPr>
+                <p:cNvPr id="12" name="直線コネクタ 11"/>
+                <p:cNvCxnSpPr/>
+                <p:nvPr/>
+              </p:nvCxnSpPr>
+              <p:spPr>
+                <a:xfrm>
+                  <a:off x="4231341" y="4231017"/>
+                  <a:ext cx="0" cy="2183130"/>
+                </a:xfrm>
+                <a:prstGeom prst="line">
+                  <a:avLst/>
+                </a:prstGeom>
+                <a:ln>
+                  <a:solidFill>
+                    <a:schemeClr val="tx1"/>
+                  </a:solidFill>
+                </a:ln>
+              </p:spPr>
+              <p:style>
+                <a:lnRef idx="1">
+                  <a:schemeClr val="accent1"/>
+                </a:lnRef>
+                <a:fillRef idx="0">
+                  <a:schemeClr val="accent1"/>
+                </a:fillRef>
+                <a:effectRef idx="0">
+                  <a:schemeClr val="accent1"/>
+                </a:effectRef>
+                <a:fontRef idx="minor">
+                  <a:schemeClr val="tx1"/>
+                </a:fontRef>
+              </p:style>
+            </p:cxnSp>
+            <p:cxnSp>
+              <p:nvCxnSpPr>
+                <p:cNvPr id="13" name="直線コネクタ 12"/>
+                <p:cNvCxnSpPr/>
+                <p:nvPr/>
+              </p:nvCxnSpPr>
+              <p:spPr>
+                <a:xfrm rot="2376410" flipV="1">
+                  <a:off x="4364896" y="4003365"/>
+                  <a:ext cx="1280160" cy="0"/>
+                </a:xfrm>
+                <a:prstGeom prst="line">
+                  <a:avLst/>
+                </a:prstGeom>
+                <a:ln w="38100">
+                  <a:solidFill>
+                    <a:schemeClr val="tx1"/>
+                  </a:solidFill>
+                </a:ln>
+              </p:spPr>
+              <p:style>
+                <a:lnRef idx="1">
+                  <a:schemeClr val="accent1"/>
+                </a:lnRef>
+                <a:fillRef idx="0">
+                  <a:schemeClr val="accent1"/>
+                </a:fillRef>
+                <a:effectRef idx="0">
+                  <a:schemeClr val="accent1"/>
+                </a:effectRef>
+                <a:fontRef idx="minor">
+                  <a:schemeClr val="tx1"/>
+                </a:fontRef>
+              </p:style>
+            </p:cxnSp>
+            <p:cxnSp>
+              <p:nvCxnSpPr>
+                <p:cNvPr id="14" name="直線コネクタ 13"/>
+                <p:cNvCxnSpPr/>
+                <p:nvPr/>
+              </p:nvCxnSpPr>
+              <p:spPr>
+                <a:xfrm rot="16918498" flipV="1">
+                  <a:off x="3740497" y="4221097"/>
+                  <a:ext cx="1280160" cy="0"/>
+                </a:xfrm>
+                <a:prstGeom prst="line">
+                  <a:avLst/>
+                </a:prstGeom>
+                <a:ln w="38100">
+                  <a:solidFill>
+                    <a:schemeClr val="tx1"/>
+                  </a:solidFill>
+                </a:ln>
+              </p:spPr>
+              <p:style>
+                <a:lnRef idx="1">
+                  <a:schemeClr val="accent1"/>
+                </a:lnRef>
+                <a:fillRef idx="0">
+                  <a:schemeClr val="accent1"/>
+                </a:fillRef>
+                <a:effectRef idx="0">
+                  <a:schemeClr val="accent1"/>
+                </a:effectRef>
+                <a:fontRef idx="minor">
+                  <a:schemeClr val="tx1"/>
+                </a:fontRef>
+              </p:style>
+            </p:cxnSp>
+            <p:sp>
+              <p:nvSpPr>
+                <p:cNvPr id="15" name="楕円 14"/>
+                <p:cNvSpPr/>
+                <p:nvPr/>
+              </p:nvSpPr>
+              <p:spPr>
+                <a:xfrm>
+                  <a:off x="4368112" y="3456446"/>
+                  <a:ext cx="287443" cy="276999"/>
+                </a:xfrm>
+                <a:prstGeom prst="ellipse">
+                  <a:avLst/>
+                </a:prstGeom>
+                <a:noFill/>
+                <a:ln w="98425" cmpd="thinThick">
+                  <a:solidFill>
+                    <a:schemeClr val="tx1"/>
+                  </a:solidFill>
+                </a:ln>
+              </p:spPr>
+              <p:style>
+                <a:lnRef idx="2">
+                  <a:schemeClr val="accent1">
+                    <a:shade val="50000"/>
+                  </a:schemeClr>
+                </a:lnRef>
+                <a:fillRef idx="1">
+                  <a:schemeClr val="accent1"/>
+                </a:fillRef>
+                <a:effectRef idx="0">
+                  <a:schemeClr val="accent1"/>
+                </a:effectRef>
+                <a:fontRef idx="minor">
+                  <a:schemeClr val="lt1"/>
+                </a:fontRef>
+              </p:style>
+              <p:txBody>
+                <a:bodyPr rtlCol="0" anchor="ctr"/>
+                <a:lstStyle/>
+                <a:p>
+                  <a:pPr algn="ctr"/>
+                  <a:endParaRPr lang="en-US"/>
+                </a:p>
+              </p:txBody>
+            </p:sp>
+            <p:sp>
+              <p:nvSpPr>
+                <p:cNvPr id="16" name="楕円 15"/>
+                <p:cNvSpPr/>
+                <p:nvPr/>
+              </p:nvSpPr>
+              <p:spPr>
+                <a:xfrm>
+                  <a:off x="5358503" y="4263961"/>
+                  <a:ext cx="287443" cy="276999"/>
+                </a:xfrm>
+                <a:prstGeom prst="ellipse">
+                  <a:avLst/>
+                </a:prstGeom>
+                <a:noFill/>
+                <a:ln w="98425" cmpd="thinThick">
+                  <a:solidFill>
+                    <a:schemeClr val="tx1"/>
+                  </a:solidFill>
+                </a:ln>
+              </p:spPr>
+              <p:style>
+                <a:lnRef idx="2">
+                  <a:schemeClr val="accent1">
+                    <a:shade val="50000"/>
+                  </a:schemeClr>
+                </a:lnRef>
+                <a:fillRef idx="1">
+                  <a:schemeClr val="accent1"/>
+                </a:fillRef>
+                <a:effectRef idx="0">
+                  <a:schemeClr val="accent1"/>
+                </a:effectRef>
+                <a:fontRef idx="minor">
+                  <a:schemeClr val="lt1"/>
+                </a:fontRef>
+              </p:style>
+              <p:txBody>
+                <a:bodyPr rtlCol="0" anchor="ctr"/>
+                <a:lstStyle/>
+                <a:p>
+                  <a:pPr algn="ctr"/>
+                  <a:endParaRPr lang="en-US"/>
+                </a:p>
+              </p:txBody>
+            </p:sp>
+            <p:sp>
+              <p:nvSpPr>
+                <p:cNvPr id="17" name="テキスト ボックス 16"/>
+                <p:cNvSpPr txBox="1"/>
+                <p:nvPr/>
+              </p:nvSpPr>
+              <p:spPr>
+                <a:xfrm>
+                  <a:off x="4667491" y="6302973"/>
+                  <a:ext cx="415498" cy="276999"/>
+                </a:xfrm>
+                <a:prstGeom prst="rect">
+                  <a:avLst/>
+                </a:prstGeom>
+                <a:noFill/>
+              </p:spPr>
+              <p:txBody>
+                <a:bodyPr wrap="none" rtlCol="0">
+                  <a:spAutoFit/>
+                </a:bodyPr>
+                <a:lstStyle/>
+                <a:p>
+                  <a:r>
+                    <a:rPr lang="en-US" sz="1200" dirty="0" smtClean="0">
+                      <a:latin typeface="Times New Roman" panose="02020603050405020304" pitchFamily="18" charset="0"/>
+                      <a:cs typeface="Times New Roman" panose="02020603050405020304" pitchFamily="18" charset="0"/>
+                    </a:rPr>
+                    <a:t>150</a:t>
+                  </a:r>
+                  <a:endParaRPr lang="en-US" sz="1200" dirty="0">
+                    <a:latin typeface="Times New Roman" panose="02020603050405020304" pitchFamily="18" charset="0"/>
+                    <a:cs typeface="Times New Roman" panose="02020603050405020304" pitchFamily="18" charset="0"/>
+                  </a:endParaRPr>
+                </a:p>
+              </p:txBody>
+            </p:sp>
+            <p:sp>
+              <p:nvSpPr>
+                <p:cNvPr id="18" name="右矢印 17"/>
+                <p:cNvSpPr/>
+                <p:nvPr/>
+              </p:nvSpPr>
+              <p:spPr>
+                <a:xfrm rot="10800000">
+                  <a:off x="3833042" y="4666438"/>
+                  <a:ext cx="400921" cy="361619"/>
+                </a:xfrm>
+                <a:prstGeom prst="rightArrow">
+                  <a:avLst/>
+                </a:prstGeom>
+                <a:pattFill prst="pct90">
+                  <a:fgClr>
+                    <a:schemeClr val="bg1">
+                      <a:lumMod val="50000"/>
+                    </a:schemeClr>
+                  </a:fgClr>
+                  <a:bgClr>
+                    <a:schemeClr val="bg1"/>
+                  </a:bgClr>
+                </a:pattFill>
+                <a:ln>
+                  <a:solidFill>
+                    <a:schemeClr val="tx1"/>
+                  </a:solidFill>
+                </a:ln>
+              </p:spPr>
+              <p:style>
+                <a:lnRef idx="2">
+                  <a:schemeClr val="accent1">
+                    <a:shade val="50000"/>
+                  </a:schemeClr>
+                </a:lnRef>
+                <a:fillRef idx="1">
+                  <a:schemeClr val="accent1"/>
+                </a:fillRef>
+                <a:effectRef idx="0">
+                  <a:schemeClr val="accent1"/>
+                </a:effectRef>
+                <a:fontRef idx="minor">
+                  <a:schemeClr val="lt1"/>
+                </a:fontRef>
+              </p:style>
+              <p:txBody>
+                <a:bodyPr rtlCol="0" anchor="ctr"/>
+                <a:lstStyle/>
+                <a:p>
+                  <a:pPr algn="ctr"/>
+                  <a:endParaRPr lang="en-US"/>
+                </a:p>
+              </p:txBody>
+            </p:sp>
+            <p:sp>
+              <p:nvSpPr>
+                <p:cNvPr id="19" name="テキスト ボックス 18"/>
+                <p:cNvSpPr txBox="1"/>
+                <p:nvPr/>
+              </p:nvSpPr>
+              <p:spPr>
+                <a:xfrm>
+                  <a:off x="3766123" y="4389438"/>
+                  <a:ext cx="449162" cy="276999"/>
+                </a:xfrm>
+                <a:prstGeom prst="rect">
+                  <a:avLst/>
+                </a:prstGeom>
+                <a:noFill/>
+              </p:spPr>
+              <p:txBody>
+                <a:bodyPr wrap="none" rtlCol="0">
+                  <a:spAutoFit/>
+                </a:bodyPr>
+                <a:lstStyle/>
+                <a:p>
+                  <a:r>
+                    <a:rPr lang="en-US" sz="1200" dirty="0" smtClean="0">
+                      <a:latin typeface="Times New Roman" panose="02020603050405020304" pitchFamily="18" charset="0"/>
+                      <a:cs typeface="Times New Roman" panose="02020603050405020304" pitchFamily="18" charset="0"/>
+                    </a:rPr>
+                    <a:t>10N</a:t>
+                  </a:r>
+                  <a:endParaRPr lang="en-US" sz="1200" dirty="0">
+                    <a:latin typeface="Times New Roman" panose="02020603050405020304" pitchFamily="18" charset="0"/>
+                    <a:cs typeface="Times New Roman" panose="02020603050405020304" pitchFamily="18" charset="0"/>
+                  </a:endParaRPr>
+                </a:p>
+              </p:txBody>
+            </p:sp>
+            <p:sp>
+              <p:nvSpPr>
+                <p:cNvPr id="20" name="円弧 19"/>
+                <p:cNvSpPr/>
+                <p:nvPr/>
+              </p:nvSpPr>
+              <p:spPr>
+                <a:xfrm rot="17795651">
+                  <a:off x="5186049" y="4067443"/>
+                  <a:ext cx="640080" cy="640080"/>
+                </a:xfrm>
+                <a:prstGeom prst="arc">
+                  <a:avLst>
+                    <a:gd name="adj1" fmla="val 16707533"/>
+                    <a:gd name="adj2" fmla="val 20204395"/>
+                  </a:avLst>
+                </a:prstGeom>
+                <a:ln>
+                  <a:solidFill>
+                    <a:schemeClr val="tx1"/>
+                  </a:solidFill>
+                  <a:headEnd type="none" w="med" len="med"/>
+                  <a:tailEnd type="triangle" w="med" len="med"/>
+                </a:ln>
+              </p:spPr>
+              <p:style>
+                <a:lnRef idx="1">
+                  <a:schemeClr val="accent1"/>
+                </a:lnRef>
+                <a:fillRef idx="0">
+                  <a:schemeClr val="accent1"/>
+                </a:fillRef>
+                <a:effectRef idx="0">
+                  <a:schemeClr val="accent1"/>
+                </a:effectRef>
+                <a:fontRef idx="minor">
+                  <a:schemeClr val="tx1"/>
+                </a:fontRef>
+              </p:style>
+              <p:txBody>
+                <a:bodyPr rtlCol="0" anchor="ctr"/>
+                <a:lstStyle/>
+                <a:p>
+                  <a:pPr algn="ctr"/>
+                  <a:endParaRPr lang="en-US"/>
+                </a:p>
+              </p:txBody>
+            </p:sp>
+            <p:sp>
+              <p:nvSpPr>
+                <p:cNvPr id="21" name="テキスト ボックス 20"/>
+                <p:cNvSpPr txBox="1"/>
+                <p:nvPr/>
+              </p:nvSpPr>
+              <p:spPr>
+                <a:xfrm>
+                  <a:off x="5468023" y="4558892"/>
+                  <a:ext cx="1063112" cy="276999"/>
+                </a:xfrm>
+                <a:prstGeom prst="rect">
+                  <a:avLst/>
+                </a:prstGeom>
+                <a:noFill/>
+              </p:spPr>
+              <p:txBody>
+                <a:bodyPr wrap="none" rtlCol="0">
+                  <a:spAutoFit/>
+                </a:bodyPr>
+                <a:lstStyle/>
+                <a:p>
+                  <a:r>
+                    <a:rPr lang="en-US" sz="1200" dirty="0" smtClean="0">
+                      <a:latin typeface="Times New Roman" panose="02020603050405020304" pitchFamily="18" charset="0"/>
+                      <a:cs typeface="Times New Roman" panose="02020603050405020304" pitchFamily="18" charset="0"/>
+                    </a:rPr>
+                    <a:t>Shoulder joint</a:t>
+                  </a:r>
+                  <a:endParaRPr lang="en-US" sz="1200" dirty="0">
+                    <a:latin typeface="Times New Roman" panose="02020603050405020304" pitchFamily="18" charset="0"/>
+                    <a:cs typeface="Times New Roman" panose="02020603050405020304" pitchFamily="18" charset="0"/>
+                  </a:endParaRPr>
+                </a:p>
+              </p:txBody>
+            </p:sp>
+            <p:sp>
+              <p:nvSpPr>
+                <p:cNvPr id="22" name="テキスト ボックス 21"/>
+                <p:cNvSpPr txBox="1"/>
+                <p:nvPr/>
+              </p:nvSpPr>
+              <p:spPr>
+                <a:xfrm>
+                  <a:off x="4449280" y="3134293"/>
+                  <a:ext cx="909223" cy="276999"/>
+                </a:xfrm>
+                <a:prstGeom prst="rect">
+                  <a:avLst/>
+                </a:prstGeom>
+                <a:noFill/>
+              </p:spPr>
+              <p:txBody>
+                <a:bodyPr wrap="none" rtlCol="0">
+                  <a:spAutoFit/>
+                </a:bodyPr>
+                <a:lstStyle/>
+                <a:p>
+                  <a:r>
+                    <a:rPr lang="en-US" sz="1200" dirty="0" smtClean="0">
+                      <a:latin typeface="Times New Roman" panose="02020603050405020304" pitchFamily="18" charset="0"/>
+                      <a:cs typeface="Times New Roman" panose="02020603050405020304" pitchFamily="18" charset="0"/>
+                    </a:rPr>
+                    <a:t>Elbow joint</a:t>
+                  </a:r>
+                  <a:endParaRPr lang="en-US" sz="1200" dirty="0">
+                    <a:latin typeface="Times New Roman" panose="02020603050405020304" pitchFamily="18" charset="0"/>
+                    <a:cs typeface="Times New Roman" panose="02020603050405020304" pitchFamily="18" charset="0"/>
+                  </a:endParaRPr>
+                </a:p>
+              </p:txBody>
+            </p:sp>
+            <p:sp>
+              <p:nvSpPr>
+                <p:cNvPr id="23" name="テキスト ボックス 22"/>
+                <p:cNvSpPr txBox="1"/>
+                <p:nvPr/>
+              </p:nvSpPr>
+              <p:spPr>
+                <a:xfrm>
+                  <a:off x="5689718" y="6302973"/>
+                  <a:ext cx="861133" cy="276999"/>
+                </a:xfrm>
+                <a:prstGeom prst="rect">
+                  <a:avLst/>
+                </a:prstGeom>
+                <a:noFill/>
+              </p:spPr>
+              <p:txBody>
+                <a:bodyPr wrap="none" rtlCol="0">
+                  <a:spAutoFit/>
+                </a:bodyPr>
+                <a:lstStyle/>
+                <a:p>
+                  <a:r>
+                    <a:rPr lang="en-US" sz="1200" dirty="0" smtClean="0">
+                      <a:latin typeface="Times New Roman" panose="02020603050405020304" pitchFamily="18" charset="0"/>
+                      <a:cs typeface="Times New Roman" panose="02020603050405020304" pitchFamily="18" charset="0"/>
+                    </a:rPr>
+                    <a:t>Units[mm]</a:t>
+                  </a:r>
+                  <a:endParaRPr lang="en-US" sz="1200" dirty="0">
+                    <a:latin typeface="Times New Roman" panose="02020603050405020304" pitchFamily="18" charset="0"/>
+                    <a:cs typeface="Times New Roman" panose="02020603050405020304" pitchFamily="18" charset="0"/>
+                  </a:endParaRPr>
+                </a:p>
+              </p:txBody>
+            </p:sp>
+          </p:grpSp>
+          <p:grpSp>
+            <p:nvGrpSpPr>
+              <p:cNvPr id="52" name="グループ化 51"/>
+              <p:cNvGrpSpPr/>
+              <p:nvPr/>
+            </p:nvGrpSpPr>
+            <p:grpSpPr>
+              <a:xfrm>
+                <a:off x="3331180" y="999839"/>
+                <a:ext cx="3080482" cy="1792544"/>
+                <a:chOff x="3588809" y="993929"/>
+                <a:chExt cx="3080482" cy="1792544"/>
+              </a:xfrm>
+            </p:grpSpPr>
+            <p:sp>
+              <p:nvSpPr>
+                <p:cNvPr id="40" name="テキスト ボックス 39"/>
+                <p:cNvSpPr txBox="1"/>
+                <p:nvPr/>
+              </p:nvSpPr>
+              <p:spPr>
+                <a:xfrm>
+                  <a:off x="5606179" y="2027707"/>
+                  <a:ext cx="1063112" cy="276999"/>
+                </a:xfrm>
+                <a:prstGeom prst="rect">
+                  <a:avLst/>
+                </a:prstGeom>
+                <a:noFill/>
+              </p:spPr>
+              <p:txBody>
+                <a:bodyPr wrap="none" rtlCol="0">
+                  <a:spAutoFit/>
+                </a:bodyPr>
+                <a:lstStyle/>
+                <a:p>
+                  <a:r>
+                    <a:rPr lang="en-US" sz="1200" dirty="0" smtClean="0">
+                      <a:latin typeface="Times New Roman" panose="02020603050405020304" pitchFamily="18" charset="0"/>
+                      <a:cs typeface="Times New Roman" panose="02020603050405020304" pitchFamily="18" charset="0"/>
+                    </a:rPr>
+                    <a:t>Shoulder joint</a:t>
+                  </a:r>
+                  <a:endParaRPr lang="en-US" sz="1200" dirty="0">
+                    <a:latin typeface="Times New Roman" panose="02020603050405020304" pitchFamily="18" charset="0"/>
+                    <a:cs typeface="Times New Roman" panose="02020603050405020304" pitchFamily="18" charset="0"/>
+                  </a:endParaRPr>
+                </a:p>
+              </p:txBody>
+            </p:sp>
+            <p:sp>
+              <p:nvSpPr>
+                <p:cNvPr id="41" name="テキスト ボックス 40"/>
+                <p:cNvSpPr txBox="1"/>
+                <p:nvPr/>
+              </p:nvSpPr>
+              <p:spPr>
+                <a:xfrm>
+                  <a:off x="4283675" y="993929"/>
+                  <a:ext cx="909223" cy="276999"/>
+                </a:xfrm>
+                <a:prstGeom prst="rect">
+                  <a:avLst/>
+                </a:prstGeom>
+                <a:noFill/>
+              </p:spPr>
+              <p:txBody>
+                <a:bodyPr wrap="none" rtlCol="0">
+                  <a:spAutoFit/>
+                </a:bodyPr>
+                <a:lstStyle/>
+                <a:p>
+                  <a:r>
+                    <a:rPr lang="en-US" sz="1200" dirty="0" smtClean="0">
+                      <a:latin typeface="Times New Roman" panose="02020603050405020304" pitchFamily="18" charset="0"/>
+                      <a:cs typeface="Times New Roman" panose="02020603050405020304" pitchFamily="18" charset="0"/>
+                    </a:rPr>
+                    <a:t>Elbow joint</a:t>
+                  </a:r>
+                  <a:endParaRPr lang="en-US" sz="1200" dirty="0">
+                    <a:latin typeface="Times New Roman" panose="02020603050405020304" pitchFamily="18" charset="0"/>
+                    <a:cs typeface="Times New Roman" panose="02020603050405020304" pitchFamily="18" charset="0"/>
+                  </a:endParaRPr>
+                </a:p>
+              </p:txBody>
+            </p:sp>
+            <p:grpSp>
+              <p:nvGrpSpPr>
+                <p:cNvPr id="50" name="グループ化 49"/>
+                <p:cNvGrpSpPr/>
+                <p:nvPr/>
+              </p:nvGrpSpPr>
+              <p:grpSpPr>
+                <a:xfrm>
+                  <a:off x="3588809" y="1047624"/>
+                  <a:ext cx="2376902" cy="1738849"/>
+                  <a:chOff x="3588809" y="1047624"/>
+                  <a:chExt cx="2376902" cy="1738849"/>
+                </a:xfrm>
+              </p:grpSpPr>
+              <p:grpSp>
+                <p:nvGrpSpPr>
+                  <p:cNvPr id="39" name="グループ化 38"/>
+                  <p:cNvGrpSpPr/>
+                  <p:nvPr/>
+                </p:nvGrpSpPr>
+                <p:grpSpPr>
+                  <a:xfrm>
+                    <a:off x="3588809" y="1047624"/>
+                    <a:ext cx="2376902" cy="1738849"/>
+                    <a:chOff x="6531135" y="1183970"/>
+                    <a:chExt cx="2376902" cy="1738849"/>
+                  </a:xfrm>
+                </p:grpSpPr>
+                <p:cxnSp>
+                  <p:nvCxnSpPr>
+                    <p:cNvPr id="24" name="直線コネクタ 23"/>
+                    <p:cNvCxnSpPr/>
+                    <p:nvPr/>
+                  </p:nvCxnSpPr>
+                  <p:spPr>
+                    <a:xfrm>
+                      <a:off x="6918313" y="1203334"/>
+                      <a:ext cx="1524600" cy="1261565"/>
+                    </a:xfrm>
+                    <a:prstGeom prst="line">
+                      <a:avLst/>
+                    </a:prstGeom>
+                    <a:ln>
+                      <a:solidFill>
+                        <a:schemeClr val="tx1"/>
+                      </a:solidFill>
+                    </a:ln>
+                  </p:spPr>
+                  <p:style>
+                    <a:lnRef idx="1">
+                      <a:schemeClr val="accent1"/>
+                    </a:lnRef>
+                    <a:fillRef idx="0">
+                      <a:schemeClr val="accent1"/>
+                    </a:fillRef>
+                    <a:effectRef idx="0">
+                      <a:schemeClr val="accent1"/>
+                    </a:effectRef>
+                    <a:fontRef idx="minor">
+                      <a:schemeClr val="tx1"/>
+                    </a:fontRef>
+                  </p:style>
+                </p:cxnSp>
+                <p:cxnSp>
+                  <p:nvCxnSpPr>
+                    <p:cNvPr id="25" name="直線コネクタ 24"/>
+                    <p:cNvCxnSpPr/>
+                    <p:nvPr/>
+                  </p:nvCxnSpPr>
+                  <p:spPr>
+                    <a:xfrm rot="16918498" flipV="1">
+                      <a:off x="6685293" y="2274570"/>
+                      <a:ext cx="1280160" cy="0"/>
+                    </a:xfrm>
+                    <a:prstGeom prst="line">
+                      <a:avLst/>
+                    </a:prstGeom>
+                    <a:ln w="38100">
+                      <a:solidFill>
+                        <a:schemeClr val="tx1"/>
+                      </a:solidFill>
+                    </a:ln>
+                  </p:spPr>
+                  <p:style>
+                    <a:lnRef idx="1">
+                      <a:schemeClr val="accent1"/>
+                    </a:lnRef>
+                    <a:fillRef idx="0">
+                      <a:schemeClr val="accent1"/>
+                    </a:fillRef>
+                    <a:effectRef idx="0">
+                      <a:schemeClr val="accent1"/>
+                    </a:effectRef>
+                    <a:fontRef idx="minor">
+                      <a:schemeClr val="tx1"/>
+                    </a:fontRef>
+                  </p:style>
+                </p:cxnSp>
+                <p:sp>
+                  <p:nvSpPr>
+                    <p:cNvPr id="26" name="楕円 25"/>
+                    <p:cNvSpPr/>
+                    <p:nvPr/>
+                  </p:nvSpPr>
+                  <p:spPr>
+                    <a:xfrm>
+                      <a:off x="7312908" y="1509919"/>
+                      <a:ext cx="287443" cy="276999"/>
+                    </a:xfrm>
+                    <a:prstGeom prst="ellipse">
+                      <a:avLst/>
+                    </a:prstGeom>
+                    <a:noFill/>
+                    <a:ln w="98425" cmpd="thinThick">
+                      <a:solidFill>
+                        <a:schemeClr val="tx1"/>
+                      </a:solidFill>
+                    </a:ln>
+                  </p:spPr>
+                  <p:style>
+                    <a:lnRef idx="2">
+                      <a:schemeClr val="accent1">
+                        <a:shade val="50000"/>
+                      </a:schemeClr>
+                    </a:lnRef>
+                    <a:fillRef idx="1">
+                      <a:schemeClr val="accent1"/>
+                    </a:fillRef>
+                    <a:effectRef idx="0">
+                      <a:schemeClr val="accent1"/>
+                    </a:effectRef>
+                    <a:fontRef idx="minor">
+                      <a:schemeClr val="lt1"/>
+                    </a:fontRef>
+                  </p:style>
+                  <p:txBody>
+                    <a:bodyPr rtlCol="0" anchor="ctr"/>
+                    <a:lstStyle/>
+                    <a:p>
+                      <a:pPr algn="ctr"/>
+                      <a:endParaRPr lang="en-US"/>
+                    </a:p>
+                  </p:txBody>
+                </p:sp>
+                <p:sp>
+                  <p:nvSpPr>
+                    <p:cNvPr id="27" name="楕円 26"/>
+                    <p:cNvSpPr/>
+                    <p:nvPr/>
+                  </p:nvSpPr>
+                  <p:spPr>
+                    <a:xfrm>
+                      <a:off x="8303299" y="2317434"/>
+                      <a:ext cx="287443" cy="276999"/>
+                    </a:xfrm>
+                    <a:prstGeom prst="ellipse">
+                      <a:avLst/>
+                    </a:prstGeom>
+                    <a:noFill/>
+                    <a:ln w="98425" cmpd="thinThick">
+                      <a:solidFill>
+                        <a:schemeClr val="tx1"/>
+                      </a:solidFill>
+                    </a:ln>
+                  </p:spPr>
+                  <p:style>
+                    <a:lnRef idx="2">
+                      <a:schemeClr val="accent1">
+                        <a:shade val="50000"/>
+                      </a:schemeClr>
+                    </a:lnRef>
+                    <a:fillRef idx="1">
+                      <a:schemeClr val="accent1"/>
+                    </a:fillRef>
+                    <a:effectRef idx="0">
+                      <a:schemeClr val="accent1"/>
+                    </a:effectRef>
+                    <a:fontRef idx="minor">
+                      <a:schemeClr val="lt1"/>
+                    </a:fontRef>
+                  </p:style>
+                  <p:txBody>
+                    <a:bodyPr rtlCol="0" anchor="ctr"/>
+                    <a:lstStyle/>
+                    <a:p>
+                      <a:pPr algn="ctr"/>
+                      <a:endParaRPr lang="en-US"/>
+                    </a:p>
+                  </p:txBody>
+                </p:sp>
+                <p:cxnSp>
+                  <p:nvCxnSpPr>
+                    <p:cNvPr id="29" name="直線コネクタ 28"/>
+                    <p:cNvCxnSpPr/>
+                    <p:nvPr/>
+                  </p:nvCxnSpPr>
+                  <p:spPr>
+                    <a:xfrm>
+                      <a:off x="8442913" y="1454845"/>
+                      <a:ext cx="0" cy="1295064"/>
+                    </a:xfrm>
+                    <a:prstGeom prst="line">
+                      <a:avLst/>
+                    </a:prstGeom>
+                    <a:ln>
+                      <a:solidFill>
+                        <a:schemeClr val="tx1"/>
+                      </a:solidFill>
+                      <a:headEnd type="arrow" w="med" len="med"/>
+                      <a:tailEnd type="none" w="med" len="med"/>
+                    </a:ln>
+                  </p:spPr>
+                  <p:style>
+                    <a:lnRef idx="1">
+                      <a:schemeClr val="accent1"/>
+                    </a:lnRef>
+                    <a:fillRef idx="0">
+                      <a:schemeClr val="accent1"/>
+                    </a:fillRef>
+                    <a:effectRef idx="0">
+                      <a:schemeClr val="accent1"/>
+                    </a:effectRef>
+                    <a:fontRef idx="minor">
+                      <a:schemeClr val="tx1"/>
+                    </a:fontRef>
+                  </p:style>
+                </p:cxnSp>
+                <p:cxnSp>
+                  <p:nvCxnSpPr>
+                    <p:cNvPr id="31" name="直線コネクタ 30"/>
+                    <p:cNvCxnSpPr/>
+                    <p:nvPr/>
+                  </p:nvCxnSpPr>
+                  <p:spPr>
+                    <a:xfrm>
+                      <a:off x="6531135" y="2464899"/>
+                      <a:ext cx="2236347" cy="0"/>
+                    </a:xfrm>
+                    <a:prstGeom prst="line">
+                      <a:avLst/>
+                    </a:prstGeom>
+                    <a:ln>
+                      <a:solidFill>
+                        <a:schemeClr val="tx1"/>
+                      </a:solidFill>
+                      <a:headEnd type="none" w="med" len="med"/>
+                      <a:tailEnd type="arrow" w="med" len="med"/>
+                    </a:ln>
+                  </p:spPr>
+                  <p:style>
+                    <a:lnRef idx="1">
+                      <a:schemeClr val="accent1"/>
+                    </a:lnRef>
+                    <a:fillRef idx="0">
+                      <a:schemeClr val="accent1"/>
+                    </a:fillRef>
+                    <a:effectRef idx="0">
+                      <a:schemeClr val="accent1"/>
+                    </a:effectRef>
+                    <a:fontRef idx="minor">
+                      <a:schemeClr val="tx1"/>
+                    </a:fontRef>
+                  </p:style>
+                </p:cxnSp>
+                <p:sp>
+                  <p:nvSpPr>
+                    <p:cNvPr id="35" name="円弧 34"/>
+                    <p:cNvSpPr/>
+                    <p:nvPr/>
+                  </p:nvSpPr>
+                  <p:spPr>
+                    <a:xfrm rot="16456281">
+                      <a:off x="8004035" y="2018817"/>
+                      <a:ext cx="904002" cy="904002"/>
+                    </a:xfrm>
+                    <a:prstGeom prst="arc">
+                      <a:avLst>
+                        <a:gd name="adj1" fmla="val 18226206"/>
+                        <a:gd name="adj2" fmla="val 21227580"/>
+                      </a:avLst>
+                    </a:prstGeom>
+                    <a:ln>
+                      <a:solidFill>
+                        <a:schemeClr val="tx1"/>
+                      </a:solidFill>
+                      <a:headEnd type="arrow" w="med" len="med"/>
+                      <a:tailEnd type="none" w="med" len="med"/>
+                    </a:ln>
+                  </p:spPr>
+                  <p:style>
+                    <a:lnRef idx="1">
+                      <a:schemeClr val="accent1"/>
+                    </a:lnRef>
+                    <a:fillRef idx="0">
+                      <a:schemeClr val="accent1"/>
+                    </a:fillRef>
+                    <a:effectRef idx="0">
+                      <a:schemeClr val="accent1"/>
+                    </a:effectRef>
+                    <a:fontRef idx="minor">
+                      <a:schemeClr val="tx1"/>
+                    </a:fontRef>
+                  </p:style>
+                  <p:txBody>
+                    <a:bodyPr rtlCol="0" anchor="ctr"/>
+                    <a:lstStyle/>
+                    <a:p>
+                      <a:pPr algn="ctr"/>
+                      <a:endParaRPr lang="en-US"/>
+                    </a:p>
+                  </p:txBody>
+                </p:sp>
+                <p:sp>
+                  <p:nvSpPr>
+                    <p:cNvPr id="36" name="円弧 35"/>
+                    <p:cNvSpPr/>
+                    <p:nvPr/>
+                  </p:nvSpPr>
+                  <p:spPr>
+                    <a:xfrm rot="10593969">
+                      <a:off x="7007115" y="1183970"/>
+                      <a:ext cx="904002" cy="904002"/>
+                    </a:xfrm>
+                    <a:prstGeom prst="arc">
+                      <a:avLst>
+                        <a:gd name="adj1" fmla="val 17145856"/>
+                        <a:gd name="adj2" fmla="val 2460363"/>
+                      </a:avLst>
+                    </a:prstGeom>
+                    <a:ln>
+                      <a:solidFill>
+                        <a:schemeClr val="tx1"/>
+                      </a:solidFill>
+                      <a:headEnd type="arrow" w="med" len="med"/>
+                      <a:tailEnd type="none" w="med" len="med"/>
+                    </a:ln>
+                  </p:spPr>
+                  <p:style>
+                    <a:lnRef idx="1">
+                      <a:schemeClr val="accent1"/>
+                    </a:lnRef>
+                    <a:fillRef idx="0">
+                      <a:schemeClr val="accent1"/>
+                    </a:fillRef>
+                    <a:effectRef idx="0">
+                      <a:schemeClr val="accent1"/>
+                    </a:effectRef>
+                    <a:fontRef idx="minor">
+                      <a:schemeClr val="tx1"/>
+                    </a:fontRef>
+                  </p:style>
+                  <p:txBody>
+                    <a:bodyPr rtlCol="0" anchor="ctr"/>
+                    <a:lstStyle/>
+                    <a:p>
+                      <a:pPr algn="ctr"/>
+                      <a:endParaRPr lang="en-US"/>
+                    </a:p>
+                  </p:txBody>
+                </p:sp>
+                <p:cxnSp>
+                  <p:nvCxnSpPr>
+                    <p:cNvPr id="38" name="直線コネクタ 37"/>
+                    <p:cNvCxnSpPr/>
+                    <p:nvPr/>
+                  </p:nvCxnSpPr>
+                  <p:spPr>
+                    <a:xfrm rot="2376410" flipV="1">
+                      <a:off x="7311815" y="2059727"/>
+                      <a:ext cx="1280160" cy="0"/>
+                    </a:xfrm>
+                    <a:prstGeom prst="line">
+                      <a:avLst/>
+                    </a:prstGeom>
+                    <a:ln w="38100">
+                      <a:solidFill>
+                        <a:schemeClr val="tx1"/>
+                      </a:solidFill>
+                    </a:ln>
+                  </p:spPr>
+                  <p:style>
+                    <a:lnRef idx="1">
+                      <a:schemeClr val="accent1"/>
+                    </a:lnRef>
+                    <a:fillRef idx="0">
+                      <a:schemeClr val="accent1"/>
+                    </a:fillRef>
+                    <a:effectRef idx="0">
+                      <a:schemeClr val="accent1"/>
+                    </a:effectRef>
+                    <a:fontRef idx="minor">
+                      <a:schemeClr val="tx1"/>
+                    </a:fontRef>
+                  </p:style>
+                </p:cxnSp>
+              </p:grpSp>
+              <p:graphicFrame>
+                <p:nvGraphicFramePr>
+                  <p:cNvPr id="43" name="オブジェクト 42"/>
+                  <p:cNvGraphicFramePr>
+                    <a:graphicFrameLocks noChangeAspect="1"/>
+                  </p:cNvGraphicFramePr>
+                  <p:nvPr>
+                    <p:extLst>
+                      <p:ext uri="{D42A27DB-BD31-4B8C-83A1-F6EECF244321}">
+                        <p14:modId xmlns:p14="http://schemas.microsoft.com/office/powerpoint/2010/main" val="2247681645"/>
+                      </p:ext>
+                    </p:extLst>
+                  </p:nvPr>
+                </p:nvGraphicFramePr>
+                <p:xfrm>
+                  <a:off x="5181616" y="1600203"/>
+                  <a:ext cx="139700" cy="203200"/>
+                </p:xfrm>
+                <a:graphic>
+                  <a:graphicData uri="http://schemas.openxmlformats.org/presentationml/2006/ole">
+                    <mc:AlternateContent xmlns:mc="http://schemas.openxmlformats.org/markup-compatibility/2006">
+                      <mc:Choice xmlns:v="urn:schemas-microsoft-com:vml" Requires="v">
+                        <p:oleObj spid="_x0000_s1040" name="数式" r:id="rId3" imgW="139639" imgH="203112" progId="Equation.3">
+                          <p:embed/>
+                        </p:oleObj>
+                      </mc:Choice>
+                      <mc:Fallback>
+                        <p:oleObj name="数式" r:id="rId3" imgW="139639" imgH="203112" progId="Equation.3">
+                          <p:embed/>
+                          <p:pic>
+                            <p:nvPicPr>
+                              <p:cNvPr id="0" name="Object 1"/>
+                              <p:cNvPicPr>
+                                <a:picLocks noChangeAspect="1" noChangeArrowheads="1"/>
+                              </p:cNvPicPr>
+                              <p:nvPr/>
+                            </p:nvPicPr>
+                            <p:blipFill>
+                              <a:blip r:embed="rId4">
+                                <a:extLst>
+                                  <a:ext uri="{28A0092B-C50C-407E-A947-70E740481C1C}">
+                                    <a14:useLocalDpi xmlns:a14="http://schemas.microsoft.com/office/drawing/2010/main" val="0"/>
+                                  </a:ext>
+                                </a:extLst>
+                              </a:blip>
+                              <a:srcRect/>
+                              <a:stretch>
+                                <a:fillRect/>
+                              </a:stretch>
+                            </p:blipFill>
+                            <p:spPr bwMode="auto">
+                              <a:xfrm>
+                                <a:off x="5181616" y="1600203"/>
+                                <a:ext cx="139700" cy="203200"/>
+                              </a:xfrm>
+                              <a:prstGeom prst="rect">
+                                <a:avLst/>
+                              </a:prstGeom>
+                              <a:noFill/>
+                              <a:extLst>
+                                <a:ext uri="{909E8E84-426E-40DD-AFC4-6F175D3DCCD1}">
+                                  <a14:hiddenFill xmlns:a14="http://schemas.microsoft.com/office/drawing/2010/main">
+                                    <a:solidFill>
+                                      <a:srgbClr val="FFFFFF"/>
+                                    </a:solidFill>
+                                  </a14:hiddenFill>
+                                </a:ext>
+                              </a:extLst>
+                            </p:spPr>
+                          </p:pic>
+                        </p:oleObj>
+                      </mc:Fallback>
+                    </mc:AlternateContent>
+                  </a:graphicData>
+                </a:graphic>
+              </p:graphicFrame>
+              <p:graphicFrame>
+                <p:nvGraphicFramePr>
+                  <p:cNvPr id="45" name="オブジェクト 44"/>
+                  <p:cNvGraphicFramePr>
+                    <a:graphicFrameLocks noChangeAspect="1"/>
+                  </p:cNvGraphicFramePr>
+                  <p:nvPr>
+                    <p:extLst>
+                      <p:ext uri="{D42A27DB-BD31-4B8C-83A1-F6EECF244321}">
+                        <p14:modId xmlns:p14="http://schemas.microsoft.com/office/powerpoint/2010/main" val="4120001618"/>
+                      </p:ext>
+                    </p:extLst>
+                  </p:nvPr>
+                </p:nvGraphicFramePr>
+                <p:xfrm>
+                  <a:off x="3825604" y="1606602"/>
+                  <a:ext cx="165100" cy="203200"/>
+                </p:xfrm>
+                <a:graphic>
+                  <a:graphicData uri="http://schemas.openxmlformats.org/presentationml/2006/ole">
+                    <mc:AlternateContent xmlns:mc="http://schemas.openxmlformats.org/markup-compatibility/2006">
+                      <mc:Choice xmlns:v="urn:schemas-microsoft-com:vml" Requires="v">
+                        <p:oleObj spid="_x0000_s1041" name="数式" r:id="rId5" imgW="164957" imgH="203024" progId="Equation.3">
+                          <p:embed/>
+                        </p:oleObj>
+                      </mc:Choice>
+                      <mc:Fallback>
+                        <p:oleObj name="数式" r:id="rId5" imgW="164957" imgH="203024" progId="Equation.3">
+                          <p:embed/>
+                          <p:pic>
+                            <p:nvPicPr>
+                              <p:cNvPr id="0" name="Object 3"/>
+                              <p:cNvPicPr>
+                                <a:picLocks noChangeAspect="1" noChangeArrowheads="1"/>
+                              </p:cNvPicPr>
+                              <p:nvPr/>
+                            </p:nvPicPr>
+                            <p:blipFill>
+                              <a:blip r:embed="rId6">
+                                <a:extLst>
+                                  <a:ext uri="{28A0092B-C50C-407E-A947-70E740481C1C}">
+                                    <a14:useLocalDpi xmlns:a14="http://schemas.microsoft.com/office/drawing/2010/main" val="0"/>
+                                  </a:ext>
+                                </a:extLst>
+                              </a:blip>
+                              <a:srcRect/>
+                              <a:stretch>
+                                <a:fillRect/>
+                              </a:stretch>
+                            </p:blipFill>
+                            <p:spPr bwMode="auto">
+                              <a:xfrm>
+                                <a:off x="3825604" y="1606602"/>
+                                <a:ext cx="165100" cy="203200"/>
+                              </a:xfrm>
+                              <a:prstGeom prst="rect">
+                                <a:avLst/>
+                              </a:prstGeom>
+                              <a:noFill/>
+                              <a:extLst>
+                                <a:ext uri="{909E8E84-426E-40DD-AFC4-6F175D3DCCD1}">
+                                  <a14:hiddenFill xmlns:a14="http://schemas.microsoft.com/office/drawing/2010/main">
+                                    <a:solidFill>
+                                      <a:srgbClr val="FFFFFF"/>
+                                    </a:solidFill>
+                                  </a14:hiddenFill>
+                                </a:ext>
+                              </a:extLst>
+                            </p:spPr>
+                          </p:pic>
+                        </p:oleObj>
+                      </mc:Fallback>
+                    </mc:AlternateContent>
+                  </a:graphicData>
+                </a:graphic>
+              </p:graphicFrame>
+              <p:graphicFrame>
+                <p:nvGraphicFramePr>
+                  <p:cNvPr id="47" name="オブジェクト 46"/>
+                  <p:cNvGraphicFramePr>
+                    <a:graphicFrameLocks noChangeAspect="1"/>
+                  </p:cNvGraphicFramePr>
+                  <p:nvPr>
+                    <p:extLst>
+                      <p:ext uri="{D42A27DB-BD31-4B8C-83A1-F6EECF244321}">
+                        <p14:modId xmlns:p14="http://schemas.microsoft.com/office/powerpoint/2010/main" val="223240694"/>
+                      </p:ext>
+                    </p:extLst>
+                  </p:nvPr>
+                </p:nvGraphicFramePr>
+                <p:xfrm>
+                  <a:off x="4202962" y="2083898"/>
+                  <a:ext cx="127000" cy="203200"/>
+                </p:xfrm>
+                <a:graphic>
+                  <a:graphicData uri="http://schemas.openxmlformats.org/presentationml/2006/ole">
+                    <mc:AlternateContent xmlns:mc="http://schemas.openxmlformats.org/markup-compatibility/2006">
+                      <mc:Choice xmlns:v="urn:schemas-microsoft-com:vml" Requires="v">
+                        <p:oleObj spid="_x0000_s1042" name="数式" r:id="rId7" imgW="126835" imgH="202936" progId="Equation.3">
+                          <p:embed/>
+                        </p:oleObj>
+                      </mc:Choice>
+                      <mc:Fallback>
+                        <p:oleObj name="数式" r:id="rId7" imgW="126835" imgH="202936" progId="Equation.3">
+                          <p:embed/>
+                          <p:pic>
+                            <p:nvPicPr>
+                              <p:cNvPr id="0" name="Object 5"/>
+                              <p:cNvPicPr>
+                                <a:picLocks noChangeAspect="1" noChangeArrowheads="1"/>
+                              </p:cNvPicPr>
+                              <p:nvPr/>
+                            </p:nvPicPr>
+                            <p:blipFill>
+                              <a:blip r:embed="rId8">
+                                <a:extLst>
+                                  <a:ext uri="{28A0092B-C50C-407E-A947-70E740481C1C}">
+                                    <a14:useLocalDpi xmlns:a14="http://schemas.microsoft.com/office/drawing/2010/main" val="0"/>
+                                  </a:ext>
+                                </a:extLst>
+                              </a:blip>
+                              <a:srcRect/>
+                              <a:stretch>
+                                <a:fillRect/>
+                              </a:stretch>
+                            </p:blipFill>
+                            <p:spPr bwMode="auto">
+                              <a:xfrm>
+                                <a:off x="4202962" y="2083898"/>
+                                <a:ext cx="127000" cy="203200"/>
+                              </a:xfrm>
+                              <a:prstGeom prst="rect">
+                                <a:avLst/>
+                              </a:prstGeom>
+                              <a:noFill/>
+                              <a:extLst>
+                                <a:ext uri="{909E8E84-426E-40DD-AFC4-6F175D3DCCD1}">
+                                  <a14:hiddenFill xmlns:a14="http://schemas.microsoft.com/office/drawing/2010/main">
+                                    <a:solidFill>
+                                      <a:srgbClr val="FFFFFF"/>
+                                    </a:solidFill>
+                                  </a14:hiddenFill>
+                                </a:ext>
+                              </a:extLst>
+                            </p:spPr>
+                          </p:pic>
+                        </p:oleObj>
+                      </mc:Fallback>
+                    </mc:AlternateContent>
+                  </a:graphicData>
+                </a:graphic>
+              </p:graphicFrame>
+              <p:graphicFrame>
+                <p:nvGraphicFramePr>
+                  <p:cNvPr id="49" name="オブジェクト 48"/>
+                  <p:cNvGraphicFramePr>
+                    <a:graphicFrameLocks noChangeAspect="1"/>
+                  </p:cNvGraphicFramePr>
+                  <p:nvPr>
+                    <p:extLst>
+                      <p:ext uri="{D42A27DB-BD31-4B8C-83A1-F6EECF244321}">
+                        <p14:modId xmlns:p14="http://schemas.microsoft.com/office/powerpoint/2010/main" val="3102313783"/>
+                      </p:ext>
+                    </p:extLst>
+                  </p:nvPr>
+                </p:nvGraphicFramePr>
+                <p:xfrm>
+                  <a:off x="4903032" y="1643370"/>
+                  <a:ext cx="114300" cy="203200"/>
+                </p:xfrm>
+                <a:graphic>
+                  <a:graphicData uri="http://schemas.openxmlformats.org/presentationml/2006/ole">
+                    <mc:AlternateContent xmlns:mc="http://schemas.openxmlformats.org/markup-compatibility/2006">
+                      <mc:Choice xmlns:v="urn:schemas-microsoft-com:vml" Requires="v">
+                        <p:oleObj spid="_x0000_s1043" name="数式" r:id="rId9" imgW="114201" imgH="203024" progId="Equation.3">
+                          <p:embed/>
+                        </p:oleObj>
+                      </mc:Choice>
+                      <mc:Fallback>
+                        <p:oleObj name="数式" r:id="rId9" imgW="114201" imgH="203024" progId="Equation.3">
+                          <p:embed/>
+                          <p:pic>
+                            <p:nvPicPr>
+                              <p:cNvPr id="0" name="Object 10"/>
+                              <p:cNvPicPr>
+                                <a:picLocks noChangeAspect="1" noChangeArrowheads="1"/>
+                              </p:cNvPicPr>
+                              <p:nvPr/>
+                            </p:nvPicPr>
+                            <p:blipFill>
+                              <a:blip r:embed="rId10">
+                                <a:extLst>
+                                  <a:ext uri="{28A0092B-C50C-407E-A947-70E740481C1C}">
+                                    <a14:useLocalDpi xmlns:a14="http://schemas.microsoft.com/office/drawing/2010/main" val="0"/>
+                                  </a:ext>
+                                </a:extLst>
+                              </a:blip>
+                              <a:srcRect/>
+                              <a:stretch>
+                                <a:fillRect/>
+                              </a:stretch>
+                            </p:blipFill>
+                            <p:spPr bwMode="auto">
+                              <a:xfrm>
+                                <a:off x="4903032" y="1643370"/>
+                                <a:ext cx="114300" cy="203200"/>
+                              </a:xfrm>
+                              <a:prstGeom prst="rect">
+                                <a:avLst/>
+                              </a:prstGeom>
+                              <a:noFill/>
+                              <a:extLst>
+                                <a:ext uri="{909E8E84-426E-40DD-AFC4-6F175D3DCCD1}">
+                                  <a14:hiddenFill xmlns:a14="http://schemas.microsoft.com/office/drawing/2010/main">
+                                    <a:solidFill>
+                                      <a:srgbClr val="FFFFFF"/>
+                                    </a:solidFill>
+                                  </a14:hiddenFill>
+                                </a:ext>
+                              </a:extLst>
+                            </p:spPr>
+                          </p:pic>
+                        </p:oleObj>
+                      </mc:Fallback>
+                    </mc:AlternateContent>
+                  </a:graphicData>
+                </a:graphic>
+              </p:graphicFrame>
+            </p:grpSp>
+          </p:grpSp>
+        </p:grpSp>
         <p:sp>
           <p:nvSpPr>
-            <p:cNvPr id="30" name="右矢印 29"/>
-            <p:cNvSpPr/>
-            <p:nvPr/>
-          </p:nvSpPr>
-          <p:spPr>
-            <a:xfrm rot="10800000">
-              <a:off x="2936073" y="3666215"/>
-              <a:ext cx="1039395" cy="329915"/>
-            </a:xfrm>
-            <a:prstGeom prst="rightArrow">
-              <a:avLst/>
-            </a:prstGeom>
-          </p:spPr>
-          <p:style>
-            <a:lnRef idx="2">
-              <a:schemeClr val="accent1">
-                <a:shade val="50000"/>
-              </a:schemeClr>
-            </a:lnRef>
-            <a:fillRef idx="1">
-              <a:schemeClr val="accent1"/>
-            </a:fillRef>
-            <a:effectRef idx="0">
-              <a:schemeClr val="accent1"/>
-            </a:effectRef>
-            <a:fontRef idx="minor">
-              <a:schemeClr val="lt1"/>
-            </a:fontRef>
-          </p:style>
-          <p:txBody>
-            <a:bodyPr rtlCol="0" anchor="ctr"/>
-            <a:lstStyle/>
-            <a:p>
-              <a:pPr algn="ctr"/>
-              <a:endParaRPr lang="en-US"/>
-            </a:p>
-          </p:txBody>
-        </p:sp>
-        <p:sp>
-          <p:nvSpPr>
-            <p:cNvPr id="31" name="テキスト ボックス 30"/>
+            <p:cNvPr id="54" name="テキスト ボックス 53"/>
             <p:cNvSpPr txBox="1"/>
             <p:nvPr/>
           </p:nvSpPr>
           <p:spPr>
             <a:xfrm>
-              <a:off x="2972364" y="3406704"/>
-              <a:ext cx="567784" cy="369332"/>
+              <a:off x="5251767" y="1138338"/>
+              <a:ext cx="261610" cy="276999"/>
             </a:xfrm>
             <a:prstGeom prst="rect">
               <a:avLst/>
@@ -3921,48 +6515,60 @@
             <a:lstStyle/>
             <a:p>
               <a:r>
-                <a:rPr lang="en-US" dirty="0" smtClean="0"/>
-                <a:t>10N</a:t>
+                <a:rPr lang="en-US" sz="1200" i="1" dirty="0" smtClean="0">
+                  <a:latin typeface="Times New Roman" panose="02020603050405020304" pitchFamily="18" charset="0"/>
+                  <a:cs typeface="Times New Roman" panose="02020603050405020304" pitchFamily="18" charset="0"/>
+                </a:rPr>
+                <a:t>y</a:t>
               </a:r>
-              <a:endParaRPr lang="en-US" dirty="0"/>
+              <a:endParaRPr lang="en-US" i="1" dirty="0">
+                <a:latin typeface="Times New Roman" panose="02020603050405020304" pitchFamily="18" charset="0"/>
+                <a:cs typeface="Times New Roman" panose="02020603050405020304" pitchFamily="18" charset="0"/>
+              </a:endParaRPr>
             </a:p>
           </p:txBody>
         </p:sp>
-        <p:cxnSp>
-          <p:nvCxnSpPr>
-            <p:cNvPr id="54" name="直線コネクタ 53"/>
-            <p:cNvCxnSpPr/>
+        <p:sp>
+          <p:nvSpPr>
+            <p:cNvPr id="55" name="テキスト ボックス 54"/>
+            <p:cNvSpPr txBox="1"/>
             <p:nvPr/>
-          </p:nvCxnSpPr>
+          </p:nvSpPr>
           <p:spPr>
             <a:xfrm>
-              <a:off x="1371600" y="5029200"/>
-              <a:ext cx="3171825" cy="0"/>
+              <a:off x="5580170" y="2251527"/>
+              <a:ext cx="261610" cy="276999"/>
             </a:xfrm>
-            <a:prstGeom prst="line">
+            <a:prstGeom prst="rect">
               <a:avLst/>
             </a:prstGeom>
+            <a:noFill/>
           </p:spPr>
-          <p:style>
-            <a:lnRef idx="1">
-              <a:schemeClr val="accent1"/>
-            </a:lnRef>
-            <a:fillRef idx="0">
-              <a:schemeClr val="accent1"/>
-            </a:fillRef>
-            <a:effectRef idx="0">
-              <a:schemeClr val="accent1"/>
-            </a:effectRef>
-            <a:fontRef idx="minor">
-              <a:schemeClr val="tx1"/>
-            </a:fontRef>
-          </p:style>
-        </p:cxnSp>
+          <p:txBody>
+            <a:bodyPr wrap="none" rtlCol="0">
+              <a:spAutoFit/>
+            </a:bodyPr>
+            <a:lstStyle/>
+            <a:p>
+              <a:r>
+                <a:rPr lang="en-US" sz="1200" i="1" dirty="0" smtClean="0">
+                  <a:latin typeface="Times New Roman" panose="02020603050405020304" pitchFamily="18" charset="0"/>
+                  <a:cs typeface="Times New Roman" panose="02020603050405020304" pitchFamily="18" charset="0"/>
+                </a:rPr>
+                <a:t>x</a:t>
+              </a:r>
+              <a:endParaRPr lang="en-US" i="1" dirty="0">
+                <a:latin typeface="Times New Roman" panose="02020603050405020304" pitchFamily="18" charset="0"/>
+                <a:cs typeface="Times New Roman" panose="02020603050405020304" pitchFamily="18" charset="0"/>
+              </a:endParaRPr>
+            </a:p>
+          </p:txBody>
+        </p:sp>
       </p:grpSp>
     </p:spTree>
     <p:extLst>
       <p:ext uri="{BB962C8B-B14F-4D97-AF65-F5344CB8AC3E}">
-        <p14:creationId xmlns:p14="http://schemas.microsoft.com/office/powerpoint/2010/main" val="3120440130"/>
+        <p14:creationId xmlns:p14="http://schemas.microsoft.com/office/powerpoint/2010/main" val="322130433"/>
       </p:ext>
     </p:extLst>
   </p:cSld>

</xml_diff>